<commit_message>
Added State Diagram to the pertinent instances
</commit_message>
<xml_diff>
--- a/TriviaMazePresentation.pptx
+++ b/TriviaMazePresentation.pptx
@@ -16,6 +16,7 @@
     <p:sldId id="263" r:id="rId11"/>
     <p:sldId id="264" r:id="rId12"/>
     <p:sldId id="265" r:id="rId13"/>
+    <p:sldId id="266" r:id="rId14"/>
   </p:sldIdLst>
   <p:sldSz cx="9144000" cy="6858000"/>
   <p:notesSz cx="7772400" cy="10058400"/>
@@ -63,7 +64,7 @@
       </p:grpSpPr>
       <p:sp>
         <p:nvSpPr>
-          <p:cNvPr id="26" name="PlaceHolder 1"/>
+          <p:cNvPr id="23" name="PlaceHolder 1"/>
           <p:cNvSpPr>
             <a:spLocks noGrp="1"/>
           </p:cNvSpPr>
@@ -73,8 +74,8 @@
         </p:nvSpPr>
         <p:spPr>
           <a:xfrm>
-            <a:off x="457200" y="274680"/>
-            <a:ext cx="8229240" cy="1143000"/>
+            <a:off x="457200" y="273600"/>
+            <a:ext cx="8229240" cy="1145160"/>
           </a:xfrm>
           <a:prstGeom prst="rect">
             <a:avLst/>
@@ -83,13 +84,14 @@
         <p:txBody>
           <a:bodyPr lIns="0" rIns="0" tIns="0" bIns="0" anchor="ctr"/>
           <a:p>
-            <a:endParaRPr/>
-          </a:p>
-        </p:txBody>
-      </p:sp>
-      <p:sp>
-        <p:nvSpPr>
-          <p:cNvPr id="27" name="PlaceHolder 2"/>
+            <a:pPr algn="ctr"/>
+            <a:endParaRPr/>
+          </a:p>
+        </p:txBody>
+      </p:sp>
+      <p:sp>
+        <p:nvSpPr>
+          <p:cNvPr id="24" name="PlaceHolder 2"/>
           <p:cNvSpPr>
             <a:spLocks noGrp="1"/>
           </p:cNvSpPr>
@@ -99,8 +101,8 @@
         </p:nvSpPr>
         <p:spPr>
           <a:xfrm>
-            <a:off x="457200" y="1600200"/>
-            <a:ext cx="8229240" cy="2158560"/>
+            <a:off x="457200" y="1604520"/>
+            <a:ext cx="8229240" cy="1896840"/>
           </a:xfrm>
           <a:prstGeom prst="rect">
             <a:avLst/>
@@ -115,7 +117,7 @@
       </p:sp>
       <p:sp>
         <p:nvSpPr>
-          <p:cNvPr id="28" name="PlaceHolder 3"/>
+          <p:cNvPr id="25" name="PlaceHolder 3"/>
           <p:cNvSpPr>
             <a:spLocks noGrp="1"/>
           </p:cNvSpPr>
@@ -125,8 +127,8 @@
         </p:nvSpPr>
         <p:spPr>
           <a:xfrm>
-            <a:off x="457200" y="3964320"/>
-            <a:ext cx="8229240" cy="2158560"/>
+            <a:off x="457200" y="3682080"/>
+            <a:ext cx="8229240" cy="1896840"/>
           </a:xfrm>
           <a:prstGeom prst="rect">
             <a:avLst/>
@@ -163,7 +165,7 @@
       </p:grpSpPr>
       <p:sp>
         <p:nvSpPr>
-          <p:cNvPr id="29" name="PlaceHolder 1"/>
+          <p:cNvPr id="26" name="PlaceHolder 1"/>
           <p:cNvSpPr>
             <a:spLocks noGrp="1"/>
           </p:cNvSpPr>
@@ -173,8 +175,8 @@
         </p:nvSpPr>
         <p:spPr>
           <a:xfrm>
-            <a:off x="457200" y="274680"/>
-            <a:ext cx="8229240" cy="1143000"/>
+            <a:off x="457200" y="273600"/>
+            <a:ext cx="8229240" cy="1145160"/>
           </a:xfrm>
           <a:prstGeom prst="rect">
             <a:avLst/>
@@ -183,13 +185,14 @@
         <p:txBody>
           <a:bodyPr lIns="0" rIns="0" tIns="0" bIns="0" anchor="ctr"/>
           <a:p>
-            <a:endParaRPr/>
-          </a:p>
-        </p:txBody>
-      </p:sp>
-      <p:sp>
-        <p:nvSpPr>
-          <p:cNvPr id="30" name="PlaceHolder 2"/>
+            <a:pPr algn="ctr"/>
+            <a:endParaRPr/>
+          </a:p>
+        </p:txBody>
+      </p:sp>
+      <p:sp>
+        <p:nvSpPr>
+          <p:cNvPr id="27" name="PlaceHolder 2"/>
           <p:cNvSpPr>
             <a:spLocks noGrp="1"/>
           </p:cNvSpPr>
@@ -199,8 +202,8 @@
         </p:nvSpPr>
         <p:spPr>
           <a:xfrm>
-            <a:off x="457200" y="1600200"/>
-            <a:ext cx="4015800" cy="2158560"/>
+            <a:off x="457200" y="1604520"/>
+            <a:ext cx="4015800" cy="1896840"/>
           </a:xfrm>
           <a:prstGeom prst="rect">
             <a:avLst/>
@@ -215,7 +218,7 @@
       </p:sp>
       <p:sp>
         <p:nvSpPr>
-          <p:cNvPr id="31" name="PlaceHolder 3"/>
+          <p:cNvPr id="28" name="PlaceHolder 3"/>
           <p:cNvSpPr>
             <a:spLocks noGrp="1"/>
           </p:cNvSpPr>
@@ -225,8 +228,8 @@
         </p:nvSpPr>
         <p:spPr>
           <a:xfrm>
-            <a:off x="4674240" y="1600200"/>
-            <a:ext cx="4015800" cy="2158560"/>
+            <a:off x="4674240" y="1604520"/>
+            <a:ext cx="4015800" cy="1896840"/>
           </a:xfrm>
           <a:prstGeom prst="rect">
             <a:avLst/>
@@ -241,7 +244,7 @@
       </p:sp>
       <p:sp>
         <p:nvSpPr>
-          <p:cNvPr id="32" name="PlaceHolder 4"/>
+          <p:cNvPr id="29" name="PlaceHolder 4"/>
           <p:cNvSpPr>
             <a:spLocks noGrp="1"/>
           </p:cNvSpPr>
@@ -251,8 +254,8 @@
         </p:nvSpPr>
         <p:spPr>
           <a:xfrm>
-            <a:off x="4674240" y="3964320"/>
-            <a:ext cx="4015800" cy="2158560"/>
+            <a:off x="4674240" y="3682080"/>
+            <a:ext cx="4015800" cy="1896840"/>
           </a:xfrm>
           <a:prstGeom prst="rect">
             <a:avLst/>
@@ -267,7 +270,7 @@
       </p:sp>
       <p:sp>
         <p:nvSpPr>
-          <p:cNvPr id="33" name="PlaceHolder 5"/>
+          <p:cNvPr id="30" name="PlaceHolder 5"/>
           <p:cNvSpPr>
             <a:spLocks noGrp="1"/>
           </p:cNvSpPr>
@@ -277,8 +280,8 @@
         </p:nvSpPr>
         <p:spPr>
           <a:xfrm>
-            <a:off x="457200" y="3964320"/>
-            <a:ext cx="4015800" cy="2158560"/>
+            <a:off x="457200" y="3682080"/>
+            <a:ext cx="4015800" cy="1896840"/>
           </a:xfrm>
           <a:prstGeom prst="rect">
             <a:avLst/>
@@ -315,7 +318,7 @@
       </p:grpSpPr>
       <p:sp>
         <p:nvSpPr>
-          <p:cNvPr id="34" name="PlaceHolder 1"/>
+          <p:cNvPr id="31" name="PlaceHolder 1"/>
           <p:cNvSpPr>
             <a:spLocks noGrp="1"/>
           </p:cNvSpPr>
@@ -325,8 +328,8 @@
         </p:nvSpPr>
         <p:spPr>
           <a:xfrm>
-            <a:off x="457200" y="274680"/>
-            <a:ext cx="8229240" cy="1143000"/>
+            <a:off x="457200" y="273600"/>
+            <a:ext cx="8229240" cy="1145160"/>
           </a:xfrm>
           <a:prstGeom prst="rect">
             <a:avLst/>
@@ -335,13 +338,14 @@
         <p:txBody>
           <a:bodyPr lIns="0" rIns="0" tIns="0" bIns="0" anchor="ctr"/>
           <a:p>
-            <a:endParaRPr/>
-          </a:p>
-        </p:txBody>
-      </p:sp>
-      <p:sp>
-        <p:nvSpPr>
-          <p:cNvPr id="35" name="PlaceHolder 2"/>
+            <a:pPr algn="ctr"/>
+            <a:endParaRPr/>
+          </a:p>
+        </p:txBody>
+      </p:sp>
+      <p:sp>
+        <p:nvSpPr>
+          <p:cNvPr id="32" name="PlaceHolder 2"/>
           <p:cNvSpPr>
             <a:spLocks noGrp="1"/>
           </p:cNvSpPr>
@@ -351,8 +355,8 @@
         </p:nvSpPr>
         <p:spPr>
           <a:xfrm>
-            <a:off x="457200" y="1600200"/>
-            <a:ext cx="8229240" cy="4525560"/>
+            <a:off x="457200" y="1604520"/>
+            <a:ext cx="8229240" cy="3977280"/>
           </a:xfrm>
           <a:prstGeom prst="rect">
             <a:avLst/>
@@ -367,7 +371,7 @@
       </p:sp>
       <p:sp>
         <p:nvSpPr>
-          <p:cNvPr id="36" name="PlaceHolder 3"/>
+          <p:cNvPr id="33" name="PlaceHolder 3"/>
           <p:cNvSpPr>
             <a:spLocks noGrp="1"/>
           </p:cNvSpPr>
@@ -377,8 +381,8 @@
         </p:nvSpPr>
         <p:spPr>
           <a:xfrm>
-            <a:off x="457200" y="1600200"/>
-            <a:ext cx="8229240" cy="4525560"/>
+            <a:off x="457200" y="1604520"/>
+            <a:ext cx="8229240" cy="3977280"/>
           </a:xfrm>
           <a:prstGeom prst="rect">
             <a:avLst/>
@@ -393,7 +397,7 @@
       </p:sp>
       <p:pic>
         <p:nvPicPr>
-          <p:cNvPr id="37" name="" descr=""/>
+          <p:cNvPr id="34" name="" descr=""/>
           <p:cNvPicPr/>
           <p:nvPr/>
         </p:nvPicPr>
@@ -405,8 +409,8 @@
         </p:blipFill>
         <p:spPr>
           <a:xfrm>
-            <a:off x="1735560" y="1599840"/>
-            <a:ext cx="5671800" cy="4525560"/>
+            <a:off x="2079000" y="1604520"/>
+            <a:ext cx="4984920" cy="3977280"/>
           </a:xfrm>
           <a:prstGeom prst="rect">
             <a:avLst/>
@@ -418,7 +422,7 @@
       </p:pic>
       <p:pic>
         <p:nvPicPr>
-          <p:cNvPr id="38" name="" descr=""/>
+          <p:cNvPr id="35" name="" descr=""/>
           <p:cNvPicPr/>
           <p:nvPr/>
         </p:nvPicPr>
@@ -430,8 +434,8 @@
         </p:blipFill>
         <p:spPr>
           <a:xfrm>
-            <a:off x="1735560" y="1599840"/>
-            <a:ext cx="5671800" cy="4525560"/>
+            <a:off x="2079000" y="1604520"/>
+            <a:ext cx="4984920" cy="3977280"/>
           </a:xfrm>
           <a:prstGeom prst="rect">
             <a:avLst/>
@@ -487,7 +491,7 @@
       </p:grpSpPr>
       <p:sp>
         <p:nvSpPr>
-          <p:cNvPr id="44" name="PlaceHolder 1"/>
+          <p:cNvPr id="38" name="PlaceHolder 1"/>
           <p:cNvSpPr>
             <a:spLocks noGrp="1"/>
           </p:cNvSpPr>
@@ -497,8 +501,8 @@
         </p:nvSpPr>
         <p:spPr>
           <a:xfrm>
-            <a:off x="457200" y="274680"/>
-            <a:ext cx="8229240" cy="1143000"/>
+            <a:off x="457200" y="273600"/>
+            <a:ext cx="8229240" cy="1145160"/>
           </a:xfrm>
           <a:prstGeom prst="rect">
             <a:avLst/>
@@ -507,13 +511,14 @@
         <p:txBody>
           <a:bodyPr lIns="0" rIns="0" tIns="0" bIns="0" anchor="ctr"/>
           <a:p>
-            <a:endParaRPr/>
-          </a:p>
-        </p:txBody>
-      </p:sp>
-      <p:sp>
-        <p:nvSpPr>
-          <p:cNvPr id="45" name="PlaceHolder 2"/>
+            <a:pPr algn="ctr"/>
+            <a:endParaRPr/>
+          </a:p>
+        </p:txBody>
+      </p:sp>
+      <p:sp>
+        <p:nvSpPr>
+          <p:cNvPr id="39" name="PlaceHolder 2"/>
           <p:cNvSpPr>
             <a:spLocks noGrp="1"/>
           </p:cNvSpPr>
@@ -523,8 +528,8 @@
         </p:nvSpPr>
         <p:spPr>
           <a:xfrm>
-            <a:off x="457200" y="1600200"/>
-            <a:ext cx="8229240" cy="4525920"/>
+            <a:off x="457200" y="1604520"/>
+            <a:ext cx="8229240" cy="3977640"/>
           </a:xfrm>
           <a:prstGeom prst="rect">
             <a:avLst/>
@@ -562,7 +567,7 @@
       </p:grpSpPr>
       <p:sp>
         <p:nvSpPr>
-          <p:cNvPr id="46" name="PlaceHolder 1"/>
+          <p:cNvPr id="40" name="PlaceHolder 1"/>
           <p:cNvSpPr>
             <a:spLocks noGrp="1"/>
           </p:cNvSpPr>
@@ -572,8 +577,8 @@
         </p:nvSpPr>
         <p:spPr>
           <a:xfrm>
-            <a:off x="457200" y="274680"/>
-            <a:ext cx="8229240" cy="1143000"/>
+            <a:off x="457200" y="273600"/>
+            <a:ext cx="8229240" cy="1145160"/>
           </a:xfrm>
           <a:prstGeom prst="rect">
             <a:avLst/>
@@ -582,13 +587,14 @@
         <p:txBody>
           <a:bodyPr lIns="0" rIns="0" tIns="0" bIns="0" anchor="ctr"/>
           <a:p>
-            <a:endParaRPr/>
-          </a:p>
-        </p:txBody>
-      </p:sp>
-      <p:sp>
-        <p:nvSpPr>
-          <p:cNvPr id="47" name="PlaceHolder 2"/>
+            <a:pPr algn="ctr"/>
+            <a:endParaRPr/>
+          </a:p>
+        </p:txBody>
+      </p:sp>
+      <p:sp>
+        <p:nvSpPr>
+          <p:cNvPr id="41" name="PlaceHolder 2"/>
           <p:cNvSpPr>
             <a:spLocks noGrp="1"/>
           </p:cNvSpPr>
@@ -598,8 +604,8 @@
         </p:nvSpPr>
         <p:spPr>
           <a:xfrm>
-            <a:off x="457200" y="1600200"/>
-            <a:ext cx="8229240" cy="4525560"/>
+            <a:off x="457200" y="1604520"/>
+            <a:ext cx="8229240" cy="3977280"/>
           </a:xfrm>
           <a:prstGeom prst="rect">
             <a:avLst/>
@@ -636,7 +642,7 @@
       </p:grpSpPr>
       <p:sp>
         <p:nvSpPr>
-          <p:cNvPr id="48" name="PlaceHolder 1"/>
+          <p:cNvPr id="42" name="PlaceHolder 1"/>
           <p:cNvSpPr>
             <a:spLocks noGrp="1"/>
           </p:cNvSpPr>
@@ -646,8 +652,8 @@
         </p:nvSpPr>
         <p:spPr>
           <a:xfrm>
-            <a:off x="457200" y="274680"/>
-            <a:ext cx="8229240" cy="1143000"/>
+            <a:off x="457200" y="273600"/>
+            <a:ext cx="8229240" cy="1145160"/>
           </a:xfrm>
           <a:prstGeom prst="rect">
             <a:avLst/>
@@ -656,13 +662,14 @@
         <p:txBody>
           <a:bodyPr lIns="0" rIns="0" tIns="0" bIns="0" anchor="ctr"/>
           <a:p>
-            <a:endParaRPr/>
-          </a:p>
-        </p:txBody>
-      </p:sp>
-      <p:sp>
-        <p:nvSpPr>
-          <p:cNvPr id="49" name="PlaceHolder 2"/>
+            <a:pPr algn="ctr"/>
+            <a:endParaRPr/>
+          </a:p>
+        </p:txBody>
+      </p:sp>
+      <p:sp>
+        <p:nvSpPr>
+          <p:cNvPr id="43" name="PlaceHolder 2"/>
           <p:cNvSpPr>
             <a:spLocks noGrp="1"/>
           </p:cNvSpPr>
@@ -672,8 +679,8 @@
         </p:nvSpPr>
         <p:spPr>
           <a:xfrm>
-            <a:off x="457200" y="1600200"/>
-            <a:ext cx="4015800" cy="4525560"/>
+            <a:off x="457200" y="1604520"/>
+            <a:ext cx="4015800" cy="3977280"/>
           </a:xfrm>
           <a:prstGeom prst="rect">
             <a:avLst/>
@@ -688,7 +695,7 @@
       </p:sp>
       <p:sp>
         <p:nvSpPr>
-          <p:cNvPr id="50" name="PlaceHolder 3"/>
+          <p:cNvPr id="44" name="PlaceHolder 3"/>
           <p:cNvSpPr>
             <a:spLocks noGrp="1"/>
           </p:cNvSpPr>
@@ -698,8 +705,8 @@
         </p:nvSpPr>
         <p:spPr>
           <a:xfrm>
-            <a:off x="4674240" y="1600200"/>
-            <a:ext cx="4015800" cy="4525560"/>
+            <a:off x="4674240" y="1604520"/>
+            <a:ext cx="4015800" cy="3977280"/>
           </a:xfrm>
           <a:prstGeom prst="rect">
             <a:avLst/>
@@ -736,7 +743,7 @@
       </p:grpSpPr>
       <p:sp>
         <p:nvSpPr>
-          <p:cNvPr id="51" name="PlaceHolder 1"/>
+          <p:cNvPr id="45" name="PlaceHolder 1"/>
           <p:cNvSpPr>
             <a:spLocks noGrp="1"/>
           </p:cNvSpPr>
@@ -746,8 +753,8 @@
         </p:nvSpPr>
         <p:spPr>
           <a:xfrm>
-            <a:off x="457200" y="274680"/>
-            <a:ext cx="8229240" cy="1143000"/>
+            <a:off x="457200" y="273600"/>
+            <a:ext cx="8229240" cy="1145160"/>
           </a:xfrm>
           <a:prstGeom prst="rect">
             <a:avLst/>
@@ -756,6 +763,7 @@
         <p:txBody>
           <a:bodyPr lIns="0" rIns="0" tIns="0" bIns="0" anchor="ctr"/>
           <a:p>
+            <a:pPr algn="ctr"/>
             <a:endParaRPr/>
           </a:p>
         </p:txBody>
@@ -784,7 +792,7 @@
       </p:grpSpPr>
       <p:sp>
         <p:nvSpPr>
-          <p:cNvPr id="52" name="PlaceHolder 1"/>
+          <p:cNvPr id="46" name="PlaceHolder 1"/>
           <p:cNvSpPr>
             <a:spLocks noGrp="1"/>
           </p:cNvSpPr>
@@ -794,8 +802,8 @@
         </p:nvSpPr>
         <p:spPr>
           <a:xfrm>
-            <a:off x="457200" y="274680"/>
-            <a:ext cx="8229240" cy="5298120"/>
+            <a:off x="457200" y="273600"/>
+            <a:ext cx="8229240" cy="5308200"/>
           </a:xfrm>
           <a:prstGeom prst="rect">
             <a:avLst/>
@@ -833,7 +841,7 @@
       </p:grpSpPr>
       <p:sp>
         <p:nvSpPr>
-          <p:cNvPr id="53" name="PlaceHolder 1"/>
+          <p:cNvPr id="47" name="PlaceHolder 1"/>
           <p:cNvSpPr>
             <a:spLocks noGrp="1"/>
           </p:cNvSpPr>
@@ -843,8 +851,8 @@
         </p:nvSpPr>
         <p:spPr>
           <a:xfrm>
-            <a:off x="457200" y="274680"/>
-            <a:ext cx="8229240" cy="1143000"/>
+            <a:off x="457200" y="273600"/>
+            <a:ext cx="8229240" cy="1145160"/>
           </a:xfrm>
           <a:prstGeom prst="rect">
             <a:avLst/>
@@ -853,13 +861,14 @@
         <p:txBody>
           <a:bodyPr lIns="0" rIns="0" tIns="0" bIns="0" anchor="ctr"/>
           <a:p>
-            <a:endParaRPr/>
-          </a:p>
-        </p:txBody>
-      </p:sp>
-      <p:sp>
-        <p:nvSpPr>
-          <p:cNvPr id="54" name="PlaceHolder 2"/>
+            <a:pPr algn="ctr"/>
+            <a:endParaRPr/>
+          </a:p>
+        </p:txBody>
+      </p:sp>
+      <p:sp>
+        <p:nvSpPr>
+          <p:cNvPr id="48" name="PlaceHolder 2"/>
           <p:cNvSpPr>
             <a:spLocks noGrp="1"/>
           </p:cNvSpPr>
@@ -869,8 +878,8 @@
         </p:nvSpPr>
         <p:spPr>
           <a:xfrm>
-            <a:off x="457200" y="1600200"/>
-            <a:ext cx="4015800" cy="2158560"/>
+            <a:off x="457200" y="1604520"/>
+            <a:ext cx="4015800" cy="1896840"/>
           </a:xfrm>
           <a:prstGeom prst="rect">
             <a:avLst/>
@@ -885,7 +894,7 @@
       </p:sp>
       <p:sp>
         <p:nvSpPr>
-          <p:cNvPr id="55" name="PlaceHolder 3"/>
+          <p:cNvPr id="49" name="PlaceHolder 3"/>
           <p:cNvSpPr>
             <a:spLocks noGrp="1"/>
           </p:cNvSpPr>
@@ -895,8 +904,8 @@
         </p:nvSpPr>
         <p:spPr>
           <a:xfrm>
-            <a:off x="457200" y="3964320"/>
-            <a:ext cx="4015800" cy="2158560"/>
+            <a:off x="457200" y="3682080"/>
+            <a:ext cx="4015800" cy="1896840"/>
           </a:xfrm>
           <a:prstGeom prst="rect">
             <a:avLst/>
@@ -911,7 +920,7 @@
       </p:sp>
       <p:sp>
         <p:nvSpPr>
-          <p:cNvPr id="56" name="PlaceHolder 4"/>
+          <p:cNvPr id="50" name="PlaceHolder 4"/>
           <p:cNvSpPr>
             <a:spLocks noGrp="1"/>
           </p:cNvSpPr>
@@ -921,8 +930,8 @@
         </p:nvSpPr>
         <p:spPr>
           <a:xfrm>
-            <a:off x="4674240" y="1600200"/>
-            <a:ext cx="4015800" cy="4525560"/>
+            <a:off x="4674240" y="1604520"/>
+            <a:ext cx="4015800" cy="3977280"/>
           </a:xfrm>
           <a:prstGeom prst="rect">
             <a:avLst/>
@@ -959,7 +968,7 @@
       </p:grpSpPr>
       <p:sp>
         <p:nvSpPr>
-          <p:cNvPr id="5" name="PlaceHolder 1"/>
+          <p:cNvPr id="2" name="PlaceHolder 1"/>
           <p:cNvSpPr>
             <a:spLocks noGrp="1"/>
           </p:cNvSpPr>
@@ -969,8 +978,8 @@
         </p:nvSpPr>
         <p:spPr>
           <a:xfrm>
-            <a:off x="457200" y="274680"/>
-            <a:ext cx="8229240" cy="1143000"/>
+            <a:off x="457200" y="273600"/>
+            <a:ext cx="8229240" cy="1145160"/>
           </a:xfrm>
           <a:prstGeom prst="rect">
             <a:avLst/>
@@ -979,13 +988,14 @@
         <p:txBody>
           <a:bodyPr lIns="0" rIns="0" tIns="0" bIns="0" anchor="ctr"/>
           <a:p>
-            <a:endParaRPr/>
-          </a:p>
-        </p:txBody>
-      </p:sp>
-      <p:sp>
-        <p:nvSpPr>
-          <p:cNvPr id="6" name="PlaceHolder 2"/>
+            <a:pPr algn="ctr"/>
+            <a:endParaRPr/>
+          </a:p>
+        </p:txBody>
+      </p:sp>
+      <p:sp>
+        <p:nvSpPr>
+          <p:cNvPr id="3" name="PlaceHolder 2"/>
           <p:cNvSpPr>
             <a:spLocks noGrp="1"/>
           </p:cNvSpPr>
@@ -995,8 +1005,8 @@
         </p:nvSpPr>
         <p:spPr>
           <a:xfrm>
-            <a:off x="457200" y="1600200"/>
-            <a:ext cx="8229240" cy="4525920"/>
+            <a:off x="457200" y="1604520"/>
+            <a:ext cx="8229240" cy="3977640"/>
           </a:xfrm>
           <a:prstGeom prst="rect">
             <a:avLst/>
@@ -1034,7 +1044,7 @@
       </p:grpSpPr>
       <p:sp>
         <p:nvSpPr>
-          <p:cNvPr id="57" name="PlaceHolder 1"/>
+          <p:cNvPr id="51" name="PlaceHolder 1"/>
           <p:cNvSpPr>
             <a:spLocks noGrp="1"/>
           </p:cNvSpPr>
@@ -1044,8 +1054,8 @@
         </p:nvSpPr>
         <p:spPr>
           <a:xfrm>
-            <a:off x="457200" y="274680"/>
-            <a:ext cx="8229240" cy="1143000"/>
+            <a:off x="457200" y="273600"/>
+            <a:ext cx="8229240" cy="1145160"/>
           </a:xfrm>
           <a:prstGeom prst="rect">
             <a:avLst/>
@@ -1054,13 +1064,14 @@
         <p:txBody>
           <a:bodyPr lIns="0" rIns="0" tIns="0" bIns="0" anchor="ctr"/>
           <a:p>
-            <a:endParaRPr/>
-          </a:p>
-        </p:txBody>
-      </p:sp>
-      <p:sp>
-        <p:nvSpPr>
-          <p:cNvPr id="58" name="PlaceHolder 2"/>
+            <a:pPr algn="ctr"/>
+            <a:endParaRPr/>
+          </a:p>
+        </p:txBody>
+      </p:sp>
+      <p:sp>
+        <p:nvSpPr>
+          <p:cNvPr id="52" name="PlaceHolder 2"/>
           <p:cNvSpPr>
             <a:spLocks noGrp="1"/>
           </p:cNvSpPr>
@@ -1070,8 +1081,8 @@
         </p:nvSpPr>
         <p:spPr>
           <a:xfrm>
-            <a:off x="457200" y="1600200"/>
-            <a:ext cx="4015800" cy="4525560"/>
+            <a:off x="457200" y="1604520"/>
+            <a:ext cx="4015800" cy="3977280"/>
           </a:xfrm>
           <a:prstGeom prst="rect">
             <a:avLst/>
@@ -1086,7 +1097,7 @@
       </p:sp>
       <p:sp>
         <p:nvSpPr>
-          <p:cNvPr id="59" name="PlaceHolder 3"/>
+          <p:cNvPr id="53" name="PlaceHolder 3"/>
           <p:cNvSpPr>
             <a:spLocks noGrp="1"/>
           </p:cNvSpPr>
@@ -1096,8 +1107,8 @@
         </p:nvSpPr>
         <p:spPr>
           <a:xfrm>
-            <a:off x="4674240" y="1600200"/>
-            <a:ext cx="4015800" cy="2158560"/>
+            <a:off x="4674240" y="1604520"/>
+            <a:ext cx="4015800" cy="1896840"/>
           </a:xfrm>
           <a:prstGeom prst="rect">
             <a:avLst/>
@@ -1112,7 +1123,7 @@
       </p:sp>
       <p:sp>
         <p:nvSpPr>
-          <p:cNvPr id="60" name="PlaceHolder 4"/>
+          <p:cNvPr id="54" name="PlaceHolder 4"/>
           <p:cNvSpPr>
             <a:spLocks noGrp="1"/>
           </p:cNvSpPr>
@@ -1122,8 +1133,8 @@
         </p:nvSpPr>
         <p:spPr>
           <a:xfrm>
-            <a:off x="4674240" y="3964320"/>
-            <a:ext cx="4015800" cy="2158560"/>
+            <a:off x="4674240" y="3682080"/>
+            <a:ext cx="4015800" cy="1896840"/>
           </a:xfrm>
           <a:prstGeom prst="rect">
             <a:avLst/>
@@ -1160,7 +1171,7 @@
       </p:grpSpPr>
       <p:sp>
         <p:nvSpPr>
-          <p:cNvPr id="61" name="PlaceHolder 1"/>
+          <p:cNvPr id="55" name="PlaceHolder 1"/>
           <p:cNvSpPr>
             <a:spLocks noGrp="1"/>
           </p:cNvSpPr>
@@ -1170,8 +1181,8 @@
         </p:nvSpPr>
         <p:spPr>
           <a:xfrm>
-            <a:off x="457200" y="274680"/>
-            <a:ext cx="8229240" cy="1143000"/>
+            <a:off x="457200" y="273600"/>
+            <a:ext cx="8229240" cy="1145160"/>
           </a:xfrm>
           <a:prstGeom prst="rect">
             <a:avLst/>
@@ -1180,13 +1191,14 @@
         <p:txBody>
           <a:bodyPr lIns="0" rIns="0" tIns="0" bIns="0" anchor="ctr"/>
           <a:p>
-            <a:endParaRPr/>
-          </a:p>
-        </p:txBody>
-      </p:sp>
-      <p:sp>
-        <p:nvSpPr>
-          <p:cNvPr id="62" name="PlaceHolder 2"/>
+            <a:pPr algn="ctr"/>
+            <a:endParaRPr/>
+          </a:p>
+        </p:txBody>
+      </p:sp>
+      <p:sp>
+        <p:nvSpPr>
+          <p:cNvPr id="56" name="PlaceHolder 2"/>
           <p:cNvSpPr>
             <a:spLocks noGrp="1"/>
           </p:cNvSpPr>
@@ -1196,8 +1208,8 @@
         </p:nvSpPr>
         <p:spPr>
           <a:xfrm>
-            <a:off x="457200" y="1600200"/>
-            <a:ext cx="4015800" cy="2158560"/>
+            <a:off x="457200" y="1604520"/>
+            <a:ext cx="4015800" cy="1896840"/>
           </a:xfrm>
           <a:prstGeom prst="rect">
             <a:avLst/>
@@ -1212,7 +1224,7 @@
       </p:sp>
       <p:sp>
         <p:nvSpPr>
-          <p:cNvPr id="63" name="PlaceHolder 3"/>
+          <p:cNvPr id="57" name="PlaceHolder 3"/>
           <p:cNvSpPr>
             <a:spLocks noGrp="1"/>
           </p:cNvSpPr>
@@ -1222,8 +1234,8 @@
         </p:nvSpPr>
         <p:spPr>
           <a:xfrm>
-            <a:off x="4674240" y="1600200"/>
-            <a:ext cx="4015800" cy="2158560"/>
+            <a:off x="4674240" y="1604520"/>
+            <a:ext cx="4015800" cy="1896840"/>
           </a:xfrm>
           <a:prstGeom prst="rect">
             <a:avLst/>
@@ -1238,7 +1250,7 @@
       </p:sp>
       <p:sp>
         <p:nvSpPr>
-          <p:cNvPr id="64" name="PlaceHolder 4"/>
+          <p:cNvPr id="58" name="PlaceHolder 4"/>
           <p:cNvSpPr>
             <a:spLocks noGrp="1"/>
           </p:cNvSpPr>
@@ -1248,8 +1260,8 @@
         </p:nvSpPr>
         <p:spPr>
           <a:xfrm>
-            <a:off x="457200" y="3964320"/>
-            <a:ext cx="8229240" cy="2158560"/>
+            <a:off x="457200" y="3682080"/>
+            <a:ext cx="8229240" cy="1896840"/>
           </a:xfrm>
           <a:prstGeom prst="rect">
             <a:avLst/>
@@ -1286,7 +1298,7 @@
       </p:grpSpPr>
       <p:sp>
         <p:nvSpPr>
-          <p:cNvPr id="65" name="PlaceHolder 1"/>
+          <p:cNvPr id="59" name="PlaceHolder 1"/>
           <p:cNvSpPr>
             <a:spLocks noGrp="1"/>
           </p:cNvSpPr>
@@ -1296,8 +1308,8 @@
         </p:nvSpPr>
         <p:spPr>
           <a:xfrm>
-            <a:off x="457200" y="274680"/>
-            <a:ext cx="8229240" cy="1143000"/>
+            <a:off x="457200" y="273600"/>
+            <a:ext cx="8229240" cy="1145160"/>
           </a:xfrm>
           <a:prstGeom prst="rect">
             <a:avLst/>
@@ -1306,13 +1318,14 @@
         <p:txBody>
           <a:bodyPr lIns="0" rIns="0" tIns="0" bIns="0" anchor="ctr"/>
           <a:p>
-            <a:endParaRPr/>
-          </a:p>
-        </p:txBody>
-      </p:sp>
-      <p:sp>
-        <p:nvSpPr>
-          <p:cNvPr id="66" name="PlaceHolder 2"/>
+            <a:pPr algn="ctr"/>
+            <a:endParaRPr/>
+          </a:p>
+        </p:txBody>
+      </p:sp>
+      <p:sp>
+        <p:nvSpPr>
+          <p:cNvPr id="60" name="PlaceHolder 2"/>
           <p:cNvSpPr>
             <a:spLocks noGrp="1"/>
           </p:cNvSpPr>
@@ -1322,8 +1335,8 @@
         </p:nvSpPr>
         <p:spPr>
           <a:xfrm>
-            <a:off x="457200" y="1600200"/>
-            <a:ext cx="8229240" cy="2158560"/>
+            <a:off x="457200" y="1604520"/>
+            <a:ext cx="8229240" cy="1896840"/>
           </a:xfrm>
           <a:prstGeom prst="rect">
             <a:avLst/>
@@ -1338,7 +1351,7 @@
       </p:sp>
       <p:sp>
         <p:nvSpPr>
-          <p:cNvPr id="67" name="PlaceHolder 3"/>
+          <p:cNvPr id="61" name="PlaceHolder 3"/>
           <p:cNvSpPr>
             <a:spLocks noGrp="1"/>
           </p:cNvSpPr>
@@ -1348,8 +1361,8 @@
         </p:nvSpPr>
         <p:spPr>
           <a:xfrm>
-            <a:off x="457200" y="3964320"/>
-            <a:ext cx="8229240" cy="2158560"/>
+            <a:off x="457200" y="3682080"/>
+            <a:ext cx="8229240" cy="1896840"/>
           </a:xfrm>
           <a:prstGeom prst="rect">
             <a:avLst/>
@@ -1386,7 +1399,7 @@
       </p:grpSpPr>
       <p:sp>
         <p:nvSpPr>
-          <p:cNvPr id="68" name="PlaceHolder 1"/>
+          <p:cNvPr id="62" name="PlaceHolder 1"/>
           <p:cNvSpPr>
             <a:spLocks noGrp="1"/>
           </p:cNvSpPr>
@@ -1396,8 +1409,8 @@
         </p:nvSpPr>
         <p:spPr>
           <a:xfrm>
-            <a:off x="457200" y="274680"/>
-            <a:ext cx="8229240" cy="1143000"/>
+            <a:off x="457200" y="273600"/>
+            <a:ext cx="8229240" cy="1145160"/>
           </a:xfrm>
           <a:prstGeom prst="rect">
             <a:avLst/>
@@ -1406,13 +1419,14 @@
         <p:txBody>
           <a:bodyPr lIns="0" rIns="0" tIns="0" bIns="0" anchor="ctr"/>
           <a:p>
-            <a:endParaRPr/>
-          </a:p>
-        </p:txBody>
-      </p:sp>
-      <p:sp>
-        <p:nvSpPr>
-          <p:cNvPr id="69" name="PlaceHolder 2"/>
+            <a:pPr algn="ctr"/>
+            <a:endParaRPr/>
+          </a:p>
+        </p:txBody>
+      </p:sp>
+      <p:sp>
+        <p:nvSpPr>
+          <p:cNvPr id="63" name="PlaceHolder 2"/>
           <p:cNvSpPr>
             <a:spLocks noGrp="1"/>
           </p:cNvSpPr>
@@ -1422,8 +1436,8 @@
         </p:nvSpPr>
         <p:spPr>
           <a:xfrm>
-            <a:off x="457200" y="1600200"/>
-            <a:ext cx="4015800" cy="2158560"/>
+            <a:off x="457200" y="1604520"/>
+            <a:ext cx="4015800" cy="1896840"/>
           </a:xfrm>
           <a:prstGeom prst="rect">
             <a:avLst/>
@@ -1438,7 +1452,7 @@
       </p:sp>
       <p:sp>
         <p:nvSpPr>
-          <p:cNvPr id="70" name="PlaceHolder 3"/>
+          <p:cNvPr id="64" name="PlaceHolder 3"/>
           <p:cNvSpPr>
             <a:spLocks noGrp="1"/>
           </p:cNvSpPr>
@@ -1448,8 +1462,8 @@
         </p:nvSpPr>
         <p:spPr>
           <a:xfrm>
-            <a:off x="4674240" y="1600200"/>
-            <a:ext cx="4015800" cy="2158560"/>
+            <a:off x="4674240" y="1604520"/>
+            <a:ext cx="4015800" cy="1896840"/>
           </a:xfrm>
           <a:prstGeom prst="rect">
             <a:avLst/>
@@ -1464,7 +1478,7 @@
       </p:sp>
       <p:sp>
         <p:nvSpPr>
-          <p:cNvPr id="71" name="PlaceHolder 4"/>
+          <p:cNvPr id="65" name="PlaceHolder 4"/>
           <p:cNvSpPr>
             <a:spLocks noGrp="1"/>
           </p:cNvSpPr>
@@ -1474,8 +1488,8 @@
         </p:nvSpPr>
         <p:spPr>
           <a:xfrm>
-            <a:off x="4674240" y="3964320"/>
-            <a:ext cx="4015800" cy="2158560"/>
+            <a:off x="4674240" y="3682080"/>
+            <a:ext cx="4015800" cy="1896840"/>
           </a:xfrm>
           <a:prstGeom prst="rect">
             <a:avLst/>
@@ -1490,7 +1504,7 @@
       </p:sp>
       <p:sp>
         <p:nvSpPr>
-          <p:cNvPr id="72" name="PlaceHolder 5"/>
+          <p:cNvPr id="66" name="PlaceHolder 5"/>
           <p:cNvSpPr>
             <a:spLocks noGrp="1"/>
           </p:cNvSpPr>
@@ -1500,8 +1514,8 @@
         </p:nvSpPr>
         <p:spPr>
           <a:xfrm>
-            <a:off x="457200" y="3964320"/>
-            <a:ext cx="4015800" cy="2158560"/>
+            <a:off x="457200" y="3682080"/>
+            <a:ext cx="4015800" cy="1896840"/>
           </a:xfrm>
           <a:prstGeom prst="rect">
             <a:avLst/>
@@ -1538,7 +1552,7 @@
       </p:grpSpPr>
       <p:sp>
         <p:nvSpPr>
-          <p:cNvPr id="73" name="PlaceHolder 1"/>
+          <p:cNvPr id="67" name="PlaceHolder 1"/>
           <p:cNvSpPr>
             <a:spLocks noGrp="1"/>
           </p:cNvSpPr>
@@ -1548,8 +1562,8 @@
         </p:nvSpPr>
         <p:spPr>
           <a:xfrm>
-            <a:off x="457200" y="274680"/>
-            <a:ext cx="8229240" cy="1143000"/>
+            <a:off x="457200" y="273600"/>
+            <a:ext cx="8229240" cy="1145160"/>
           </a:xfrm>
           <a:prstGeom prst="rect">
             <a:avLst/>
@@ -1558,13 +1572,14 @@
         <p:txBody>
           <a:bodyPr lIns="0" rIns="0" tIns="0" bIns="0" anchor="ctr"/>
           <a:p>
-            <a:endParaRPr/>
-          </a:p>
-        </p:txBody>
-      </p:sp>
-      <p:sp>
-        <p:nvSpPr>
-          <p:cNvPr id="74" name="PlaceHolder 2"/>
+            <a:pPr algn="ctr"/>
+            <a:endParaRPr/>
+          </a:p>
+        </p:txBody>
+      </p:sp>
+      <p:sp>
+        <p:nvSpPr>
+          <p:cNvPr id="68" name="PlaceHolder 2"/>
           <p:cNvSpPr>
             <a:spLocks noGrp="1"/>
           </p:cNvSpPr>
@@ -1574,8 +1589,8 @@
         </p:nvSpPr>
         <p:spPr>
           <a:xfrm>
-            <a:off x="457200" y="1600200"/>
-            <a:ext cx="8229240" cy="4525560"/>
+            <a:off x="457200" y="1604520"/>
+            <a:ext cx="8229240" cy="3977280"/>
           </a:xfrm>
           <a:prstGeom prst="rect">
             <a:avLst/>
@@ -1590,7 +1605,7 @@
       </p:sp>
       <p:sp>
         <p:nvSpPr>
-          <p:cNvPr id="75" name="PlaceHolder 3"/>
+          <p:cNvPr id="69" name="PlaceHolder 3"/>
           <p:cNvSpPr>
             <a:spLocks noGrp="1"/>
           </p:cNvSpPr>
@@ -1600,8 +1615,8 @@
         </p:nvSpPr>
         <p:spPr>
           <a:xfrm>
-            <a:off x="457200" y="1600200"/>
-            <a:ext cx="8229240" cy="4525560"/>
+            <a:off x="457200" y="1604520"/>
+            <a:ext cx="8229240" cy="3977280"/>
           </a:xfrm>
           <a:prstGeom prst="rect">
             <a:avLst/>
@@ -1616,7 +1631,7 @@
       </p:sp>
       <p:pic>
         <p:nvPicPr>
-          <p:cNvPr id="76" name="" descr=""/>
+          <p:cNvPr id="70" name="" descr=""/>
           <p:cNvPicPr/>
           <p:nvPr/>
         </p:nvPicPr>
@@ -1628,8 +1643,8 @@
         </p:blipFill>
         <p:spPr>
           <a:xfrm>
-            <a:off x="1735560" y="1599840"/>
-            <a:ext cx="5671800" cy="4525560"/>
+            <a:off x="2079000" y="1604520"/>
+            <a:ext cx="4984920" cy="3977280"/>
           </a:xfrm>
           <a:prstGeom prst="rect">
             <a:avLst/>
@@ -1641,7 +1656,7 @@
       </p:pic>
       <p:pic>
         <p:nvPicPr>
-          <p:cNvPr id="77" name="" descr=""/>
+          <p:cNvPr id="71" name="" descr=""/>
           <p:cNvPicPr/>
           <p:nvPr/>
         </p:nvPicPr>
@@ -1653,8 +1668,8 @@
         </p:blipFill>
         <p:spPr>
           <a:xfrm>
-            <a:off x="1735560" y="1599840"/>
-            <a:ext cx="5671800" cy="4525560"/>
+            <a:off x="2079000" y="1604520"/>
+            <a:ext cx="4984920" cy="3977280"/>
           </a:xfrm>
           <a:prstGeom prst="rect">
             <a:avLst/>
@@ -1688,7 +1703,7 @@
       </p:grpSpPr>
       <p:sp>
         <p:nvSpPr>
-          <p:cNvPr id="7" name="PlaceHolder 1"/>
+          <p:cNvPr id="4" name="PlaceHolder 1"/>
           <p:cNvSpPr>
             <a:spLocks noGrp="1"/>
           </p:cNvSpPr>
@@ -1698,8 +1713,8 @@
         </p:nvSpPr>
         <p:spPr>
           <a:xfrm>
-            <a:off x="457200" y="274680"/>
-            <a:ext cx="8229240" cy="1143000"/>
+            <a:off x="457200" y="273600"/>
+            <a:ext cx="8229240" cy="1145160"/>
           </a:xfrm>
           <a:prstGeom prst="rect">
             <a:avLst/>
@@ -1708,13 +1723,14 @@
         <p:txBody>
           <a:bodyPr lIns="0" rIns="0" tIns="0" bIns="0" anchor="ctr"/>
           <a:p>
-            <a:endParaRPr/>
-          </a:p>
-        </p:txBody>
-      </p:sp>
-      <p:sp>
-        <p:nvSpPr>
-          <p:cNvPr id="8" name="PlaceHolder 2"/>
+            <a:pPr algn="ctr"/>
+            <a:endParaRPr/>
+          </a:p>
+        </p:txBody>
+      </p:sp>
+      <p:sp>
+        <p:nvSpPr>
+          <p:cNvPr id="5" name="PlaceHolder 2"/>
           <p:cNvSpPr>
             <a:spLocks noGrp="1"/>
           </p:cNvSpPr>
@@ -1724,8 +1740,8 @@
         </p:nvSpPr>
         <p:spPr>
           <a:xfrm>
-            <a:off x="457200" y="1600200"/>
-            <a:ext cx="8229240" cy="4525560"/>
+            <a:off x="457200" y="1604520"/>
+            <a:ext cx="8229240" cy="3977280"/>
           </a:xfrm>
           <a:prstGeom prst="rect">
             <a:avLst/>
@@ -1762,7 +1778,7 @@
       </p:grpSpPr>
       <p:sp>
         <p:nvSpPr>
-          <p:cNvPr id="9" name="PlaceHolder 1"/>
+          <p:cNvPr id="6" name="PlaceHolder 1"/>
           <p:cNvSpPr>
             <a:spLocks noGrp="1"/>
           </p:cNvSpPr>
@@ -1772,8 +1788,8 @@
         </p:nvSpPr>
         <p:spPr>
           <a:xfrm>
-            <a:off x="457200" y="274680"/>
-            <a:ext cx="8229240" cy="1143000"/>
+            <a:off x="457200" y="273600"/>
+            <a:ext cx="8229240" cy="1145160"/>
           </a:xfrm>
           <a:prstGeom prst="rect">
             <a:avLst/>
@@ -1782,13 +1798,14 @@
         <p:txBody>
           <a:bodyPr lIns="0" rIns="0" tIns="0" bIns="0" anchor="ctr"/>
           <a:p>
-            <a:endParaRPr/>
-          </a:p>
-        </p:txBody>
-      </p:sp>
-      <p:sp>
-        <p:nvSpPr>
-          <p:cNvPr id="10" name="PlaceHolder 2"/>
+            <a:pPr algn="ctr"/>
+            <a:endParaRPr/>
+          </a:p>
+        </p:txBody>
+      </p:sp>
+      <p:sp>
+        <p:nvSpPr>
+          <p:cNvPr id="7" name="PlaceHolder 2"/>
           <p:cNvSpPr>
             <a:spLocks noGrp="1"/>
           </p:cNvSpPr>
@@ -1798,8 +1815,8 @@
         </p:nvSpPr>
         <p:spPr>
           <a:xfrm>
-            <a:off x="457200" y="1600200"/>
-            <a:ext cx="4015800" cy="4525560"/>
+            <a:off x="457200" y="1604520"/>
+            <a:ext cx="4015800" cy="3977280"/>
           </a:xfrm>
           <a:prstGeom prst="rect">
             <a:avLst/>
@@ -1814,7 +1831,7 @@
       </p:sp>
       <p:sp>
         <p:nvSpPr>
-          <p:cNvPr id="11" name="PlaceHolder 3"/>
+          <p:cNvPr id="8" name="PlaceHolder 3"/>
           <p:cNvSpPr>
             <a:spLocks noGrp="1"/>
           </p:cNvSpPr>
@@ -1824,8 +1841,8 @@
         </p:nvSpPr>
         <p:spPr>
           <a:xfrm>
-            <a:off x="4674240" y="1600200"/>
-            <a:ext cx="4015800" cy="4525560"/>
+            <a:off x="4674240" y="1604520"/>
+            <a:ext cx="4015800" cy="3977280"/>
           </a:xfrm>
           <a:prstGeom prst="rect">
             <a:avLst/>
@@ -1862,7 +1879,7 @@
       </p:grpSpPr>
       <p:sp>
         <p:nvSpPr>
-          <p:cNvPr id="12" name="PlaceHolder 1"/>
+          <p:cNvPr id="9" name="PlaceHolder 1"/>
           <p:cNvSpPr>
             <a:spLocks noGrp="1"/>
           </p:cNvSpPr>
@@ -1872,8 +1889,8 @@
         </p:nvSpPr>
         <p:spPr>
           <a:xfrm>
-            <a:off x="457200" y="274680"/>
-            <a:ext cx="8229240" cy="1143000"/>
+            <a:off x="457200" y="273600"/>
+            <a:ext cx="8229240" cy="1145160"/>
           </a:xfrm>
           <a:prstGeom prst="rect">
             <a:avLst/>
@@ -1882,6 +1899,7 @@
         <p:txBody>
           <a:bodyPr lIns="0" rIns="0" tIns="0" bIns="0" anchor="ctr"/>
           <a:p>
+            <a:pPr algn="ctr"/>
             <a:endParaRPr/>
           </a:p>
         </p:txBody>
@@ -1910,7 +1928,7 @@
       </p:grpSpPr>
       <p:sp>
         <p:nvSpPr>
-          <p:cNvPr id="13" name="PlaceHolder 1"/>
+          <p:cNvPr id="10" name="PlaceHolder 1"/>
           <p:cNvSpPr>
             <a:spLocks noGrp="1"/>
           </p:cNvSpPr>
@@ -1920,8 +1938,8 @@
         </p:nvSpPr>
         <p:spPr>
           <a:xfrm>
-            <a:off x="457200" y="274680"/>
-            <a:ext cx="8229240" cy="5298120"/>
+            <a:off x="457200" y="273600"/>
+            <a:ext cx="8229240" cy="5308200"/>
           </a:xfrm>
           <a:prstGeom prst="rect">
             <a:avLst/>
@@ -1959,7 +1977,7 @@
       </p:grpSpPr>
       <p:sp>
         <p:nvSpPr>
-          <p:cNvPr id="14" name="PlaceHolder 1"/>
+          <p:cNvPr id="11" name="PlaceHolder 1"/>
           <p:cNvSpPr>
             <a:spLocks noGrp="1"/>
           </p:cNvSpPr>
@@ -1969,8 +1987,8 @@
         </p:nvSpPr>
         <p:spPr>
           <a:xfrm>
-            <a:off x="457200" y="274680"/>
-            <a:ext cx="8229240" cy="1143000"/>
+            <a:off x="457200" y="273600"/>
+            <a:ext cx="8229240" cy="1145160"/>
           </a:xfrm>
           <a:prstGeom prst="rect">
             <a:avLst/>
@@ -1979,13 +1997,14 @@
         <p:txBody>
           <a:bodyPr lIns="0" rIns="0" tIns="0" bIns="0" anchor="ctr"/>
           <a:p>
-            <a:endParaRPr/>
-          </a:p>
-        </p:txBody>
-      </p:sp>
-      <p:sp>
-        <p:nvSpPr>
-          <p:cNvPr id="15" name="PlaceHolder 2"/>
+            <a:pPr algn="ctr"/>
+            <a:endParaRPr/>
+          </a:p>
+        </p:txBody>
+      </p:sp>
+      <p:sp>
+        <p:nvSpPr>
+          <p:cNvPr id="12" name="PlaceHolder 2"/>
           <p:cNvSpPr>
             <a:spLocks noGrp="1"/>
           </p:cNvSpPr>
@@ -1995,8 +2014,8 @@
         </p:nvSpPr>
         <p:spPr>
           <a:xfrm>
-            <a:off x="457200" y="1600200"/>
-            <a:ext cx="4015800" cy="2158560"/>
+            <a:off x="457200" y="1604520"/>
+            <a:ext cx="4015800" cy="1896840"/>
           </a:xfrm>
           <a:prstGeom prst="rect">
             <a:avLst/>
@@ -2011,7 +2030,7 @@
       </p:sp>
       <p:sp>
         <p:nvSpPr>
-          <p:cNvPr id="16" name="PlaceHolder 3"/>
+          <p:cNvPr id="13" name="PlaceHolder 3"/>
           <p:cNvSpPr>
             <a:spLocks noGrp="1"/>
           </p:cNvSpPr>
@@ -2021,8 +2040,8 @@
         </p:nvSpPr>
         <p:spPr>
           <a:xfrm>
-            <a:off x="457200" y="3964320"/>
-            <a:ext cx="4015800" cy="2158560"/>
+            <a:off x="457200" y="3682080"/>
+            <a:ext cx="4015800" cy="1896840"/>
           </a:xfrm>
           <a:prstGeom prst="rect">
             <a:avLst/>
@@ -2037,7 +2056,7 @@
       </p:sp>
       <p:sp>
         <p:nvSpPr>
-          <p:cNvPr id="17" name="PlaceHolder 4"/>
+          <p:cNvPr id="14" name="PlaceHolder 4"/>
           <p:cNvSpPr>
             <a:spLocks noGrp="1"/>
           </p:cNvSpPr>
@@ -2047,8 +2066,8 @@
         </p:nvSpPr>
         <p:spPr>
           <a:xfrm>
-            <a:off x="4674240" y="1600200"/>
-            <a:ext cx="4015800" cy="4525560"/>
+            <a:off x="4674240" y="1604520"/>
+            <a:ext cx="4015800" cy="3977280"/>
           </a:xfrm>
           <a:prstGeom prst="rect">
             <a:avLst/>
@@ -2085,7 +2104,7 @@
       </p:grpSpPr>
       <p:sp>
         <p:nvSpPr>
-          <p:cNvPr id="18" name="PlaceHolder 1"/>
+          <p:cNvPr id="15" name="PlaceHolder 1"/>
           <p:cNvSpPr>
             <a:spLocks noGrp="1"/>
           </p:cNvSpPr>
@@ -2095,8 +2114,8 @@
         </p:nvSpPr>
         <p:spPr>
           <a:xfrm>
-            <a:off x="457200" y="274680"/>
-            <a:ext cx="8229240" cy="1143000"/>
+            <a:off x="457200" y="273600"/>
+            <a:ext cx="8229240" cy="1145160"/>
           </a:xfrm>
           <a:prstGeom prst="rect">
             <a:avLst/>
@@ -2105,13 +2124,14 @@
         <p:txBody>
           <a:bodyPr lIns="0" rIns="0" tIns="0" bIns="0" anchor="ctr"/>
           <a:p>
-            <a:endParaRPr/>
-          </a:p>
-        </p:txBody>
-      </p:sp>
-      <p:sp>
-        <p:nvSpPr>
-          <p:cNvPr id="19" name="PlaceHolder 2"/>
+            <a:pPr algn="ctr"/>
+            <a:endParaRPr/>
+          </a:p>
+        </p:txBody>
+      </p:sp>
+      <p:sp>
+        <p:nvSpPr>
+          <p:cNvPr id="16" name="PlaceHolder 2"/>
           <p:cNvSpPr>
             <a:spLocks noGrp="1"/>
           </p:cNvSpPr>
@@ -2121,8 +2141,8 @@
         </p:nvSpPr>
         <p:spPr>
           <a:xfrm>
-            <a:off x="457200" y="1600200"/>
-            <a:ext cx="4015800" cy="4525560"/>
+            <a:off x="457200" y="1604520"/>
+            <a:ext cx="4015800" cy="3977280"/>
           </a:xfrm>
           <a:prstGeom prst="rect">
             <a:avLst/>
@@ -2137,7 +2157,7 @@
       </p:sp>
       <p:sp>
         <p:nvSpPr>
-          <p:cNvPr id="20" name="PlaceHolder 3"/>
+          <p:cNvPr id="17" name="PlaceHolder 3"/>
           <p:cNvSpPr>
             <a:spLocks noGrp="1"/>
           </p:cNvSpPr>
@@ -2147,8 +2167,8 @@
         </p:nvSpPr>
         <p:spPr>
           <a:xfrm>
-            <a:off x="4674240" y="1600200"/>
-            <a:ext cx="4015800" cy="2158560"/>
+            <a:off x="4674240" y="1604520"/>
+            <a:ext cx="4015800" cy="1896840"/>
           </a:xfrm>
           <a:prstGeom prst="rect">
             <a:avLst/>
@@ -2163,7 +2183,7 @@
       </p:sp>
       <p:sp>
         <p:nvSpPr>
-          <p:cNvPr id="21" name="PlaceHolder 4"/>
+          <p:cNvPr id="18" name="PlaceHolder 4"/>
           <p:cNvSpPr>
             <a:spLocks noGrp="1"/>
           </p:cNvSpPr>
@@ -2173,8 +2193,8 @@
         </p:nvSpPr>
         <p:spPr>
           <a:xfrm>
-            <a:off x="4674240" y="3964320"/>
-            <a:ext cx="4015800" cy="2158560"/>
+            <a:off x="4674240" y="3682080"/>
+            <a:ext cx="4015800" cy="1896840"/>
           </a:xfrm>
           <a:prstGeom prst="rect">
             <a:avLst/>
@@ -2211,7 +2231,7 @@
       </p:grpSpPr>
       <p:sp>
         <p:nvSpPr>
-          <p:cNvPr id="22" name="PlaceHolder 1"/>
+          <p:cNvPr id="19" name="PlaceHolder 1"/>
           <p:cNvSpPr>
             <a:spLocks noGrp="1"/>
           </p:cNvSpPr>
@@ -2221,8 +2241,8 @@
         </p:nvSpPr>
         <p:spPr>
           <a:xfrm>
-            <a:off x="457200" y="274680"/>
-            <a:ext cx="8229240" cy="1143000"/>
+            <a:off x="457200" y="273600"/>
+            <a:ext cx="8229240" cy="1145160"/>
           </a:xfrm>
           <a:prstGeom prst="rect">
             <a:avLst/>
@@ -2231,13 +2251,14 @@
         <p:txBody>
           <a:bodyPr lIns="0" rIns="0" tIns="0" bIns="0" anchor="ctr"/>
           <a:p>
-            <a:endParaRPr/>
-          </a:p>
-        </p:txBody>
-      </p:sp>
-      <p:sp>
-        <p:nvSpPr>
-          <p:cNvPr id="23" name="PlaceHolder 2"/>
+            <a:pPr algn="ctr"/>
+            <a:endParaRPr/>
+          </a:p>
+        </p:txBody>
+      </p:sp>
+      <p:sp>
+        <p:nvSpPr>
+          <p:cNvPr id="20" name="PlaceHolder 2"/>
           <p:cNvSpPr>
             <a:spLocks noGrp="1"/>
           </p:cNvSpPr>
@@ -2247,8 +2268,8 @@
         </p:nvSpPr>
         <p:spPr>
           <a:xfrm>
-            <a:off x="457200" y="1600200"/>
-            <a:ext cx="4015800" cy="2158560"/>
+            <a:off x="457200" y="1604520"/>
+            <a:ext cx="4015800" cy="1896840"/>
           </a:xfrm>
           <a:prstGeom prst="rect">
             <a:avLst/>
@@ -2263,7 +2284,7 @@
       </p:sp>
       <p:sp>
         <p:nvSpPr>
-          <p:cNvPr id="24" name="PlaceHolder 3"/>
+          <p:cNvPr id="21" name="PlaceHolder 3"/>
           <p:cNvSpPr>
             <a:spLocks noGrp="1"/>
           </p:cNvSpPr>
@@ -2273,8 +2294,8 @@
         </p:nvSpPr>
         <p:spPr>
           <a:xfrm>
-            <a:off x="4674240" y="1600200"/>
-            <a:ext cx="4015800" cy="2158560"/>
+            <a:off x="4674240" y="1604520"/>
+            <a:ext cx="4015800" cy="1896840"/>
           </a:xfrm>
           <a:prstGeom prst="rect">
             <a:avLst/>
@@ -2289,7 +2310,7 @@
       </p:sp>
       <p:sp>
         <p:nvSpPr>
-          <p:cNvPr id="25" name="PlaceHolder 4"/>
+          <p:cNvPr id="22" name="PlaceHolder 4"/>
           <p:cNvSpPr>
             <a:spLocks noGrp="1"/>
           </p:cNvSpPr>
@@ -2299,8 +2320,8 @@
         </p:nvSpPr>
         <p:spPr>
           <a:xfrm>
-            <a:off x="457200" y="3964320"/>
-            <a:ext cx="8229240" cy="2158560"/>
+            <a:off x="457200" y="3682080"/>
+            <a:ext cx="8229240" cy="1896840"/>
           </a:xfrm>
           <a:prstGeom prst="rect">
             <a:avLst/>
@@ -2354,29 +2375,21 @@
         </p:nvSpPr>
         <p:spPr>
           <a:xfrm>
-            <a:off x="685800" y="2130480"/>
-            <a:ext cx="7772040" cy="1469520"/>
-          </a:xfrm>
-          <a:prstGeom prst="rect">
-            <a:avLst/>
-          </a:prstGeom>
-        </p:spPr>
-        <p:txBody>
-          <a:bodyPr anchor="ctr"/>
-          <a:p>
-            <a:pPr algn="ctr">
-              <a:lnSpc>
-                <a:spcPct val="100000"/>
-              </a:lnSpc>
-            </a:pPr>
+            <a:off x="457200" y="274680"/>
+            <a:ext cx="8228880" cy="1142640"/>
+          </a:xfrm>
+          <a:prstGeom prst="rect">
+            <a:avLst/>
+          </a:prstGeom>
+        </p:spPr>
+        <p:txBody>
+          <a:bodyPr lIns="0" rIns="0" tIns="0" bIns="0" anchor="ctr"/>
+          <a:p>
             <a:r>
-              <a:rPr lang="en-US" sz="4400">
-                <a:solidFill>
-                  <a:srgbClr val="000000"/>
-                </a:solidFill>
-                <a:latin typeface="Calibri"/>
+              <a:rPr lang="en-US">
+                <a:latin typeface="Arial"/>
               </a:rPr>
-              <a:t>Click to edit the title text formatClick to edit Master title style</a:t>
+              <a:t>Click to edit the title text format</a:t>
             </a:r>
             <a:endParaRPr/>
           </a:p>
@@ -2385,112 +2398,6 @@
       <p:sp>
         <p:nvSpPr>
           <p:cNvPr id="1" name="PlaceHolder 2"/>
-          <p:cNvSpPr>
-            <a:spLocks noGrp="1"/>
-          </p:cNvSpPr>
-          <p:nvPr>
-            <p:ph type="dt"/>
-          </p:nvPr>
-        </p:nvSpPr>
-        <p:spPr>
-          <a:xfrm>
-            <a:off x="457200" y="6356520"/>
-            <a:ext cx="2133360" cy="364680"/>
-          </a:xfrm>
-          <a:prstGeom prst="rect">
-            <a:avLst/>
-          </a:prstGeom>
-        </p:spPr>
-        <p:txBody>
-          <a:bodyPr anchor="ctr"/>
-          <a:p>
-            <a:pPr>
-              <a:lnSpc>
-                <a:spcPct val="100000"/>
-              </a:lnSpc>
-            </a:pPr>
-            <a:r>
-              <a:rPr lang="en-US" sz="1200">
-                <a:solidFill>
-                  <a:srgbClr val="8b8b8b"/>
-                </a:solidFill>
-                <a:latin typeface="Calibri"/>
-              </a:rPr>
-              <a:t>6/11/15</a:t>
-            </a:r>
-            <a:endParaRPr/>
-          </a:p>
-        </p:txBody>
-      </p:sp>
-      <p:sp>
-        <p:nvSpPr>
-          <p:cNvPr id="2" name="PlaceHolder 3"/>
-          <p:cNvSpPr>
-            <a:spLocks noGrp="1"/>
-          </p:cNvSpPr>
-          <p:nvPr>
-            <p:ph type="ftr"/>
-          </p:nvPr>
-        </p:nvSpPr>
-        <p:spPr>
-          <a:xfrm>
-            <a:off x="3124080" y="6356520"/>
-            <a:ext cx="2895120" cy="364680"/>
-          </a:xfrm>
-          <a:prstGeom prst="rect">
-            <a:avLst/>
-          </a:prstGeom>
-        </p:spPr>
-        <p:txBody>
-          <a:bodyPr anchor="ctr"/>
-          <a:p>
-            <a:endParaRPr/>
-          </a:p>
-        </p:txBody>
-      </p:sp>
-      <p:sp>
-        <p:nvSpPr>
-          <p:cNvPr id="3" name="PlaceHolder 4"/>
-          <p:cNvSpPr>
-            <a:spLocks noGrp="1"/>
-          </p:cNvSpPr>
-          <p:nvPr>
-            <p:ph type="sldNum"/>
-          </p:nvPr>
-        </p:nvSpPr>
-        <p:spPr>
-          <a:xfrm>
-            <a:off x="6553080" y="6356520"/>
-            <a:ext cx="2133360" cy="364680"/>
-          </a:xfrm>
-          <a:prstGeom prst="rect">
-            <a:avLst/>
-          </a:prstGeom>
-        </p:spPr>
-        <p:txBody>
-          <a:bodyPr anchor="ctr"/>
-          <a:p>
-            <a:pPr algn="r">
-              <a:lnSpc>
-                <a:spcPct val="100000"/>
-              </a:lnSpc>
-            </a:pPr>
-            <a:fld id="{71152EE4-A8D1-4CE0-A6F7-D636320F8271}" type="slidenum">
-              <a:rPr lang="en-US" sz="1200">
-                <a:solidFill>
-                  <a:srgbClr val="8b8b8b"/>
-                </a:solidFill>
-                <a:latin typeface="Calibri"/>
-              </a:rPr>
-              <a:t>&lt;number&gt;</a:t>
-            </a:fld>
-            <a:endParaRPr/>
-          </a:p>
-        </p:txBody>
-      </p:sp>
-      <p:sp>
-        <p:nvSpPr>
-          <p:cNvPr id="4" name="PlaceHolder 5"/>
           <p:cNvSpPr>
             <a:spLocks noGrp="1"/>
           </p:cNvSpPr>
@@ -2517,7 +2424,7 @@
             </a:pPr>
             <a:r>
               <a:rPr lang="en-US" sz="3200">
-                <a:latin typeface="Calibri"/>
+                <a:latin typeface="Arial"/>
               </a:rPr>
               <a:t>Click to edit the outline text format</a:t>
             </a:r>
@@ -2530,8 +2437,8 @@
               <a:buChar char=""/>
             </a:pPr>
             <a:r>
-              <a:rPr lang="en-US" sz="2400">
-                <a:latin typeface="Calibri"/>
+              <a:rPr lang="en-US" sz="2800">
+                <a:latin typeface="Arial"/>
               </a:rPr>
               <a:t>Second Outline Level</a:t>
             </a:r>
@@ -2544,8 +2451,8 @@
               <a:buChar char=""/>
             </a:pPr>
             <a:r>
-              <a:rPr lang="en-US" sz="2000">
-                <a:latin typeface="Calibri"/>
+              <a:rPr lang="en-US" sz="2400">
+                <a:latin typeface="Arial"/>
               </a:rPr>
               <a:t>Third Outline Level</a:t>
             </a:r>
@@ -2559,7 +2466,7 @@
             </a:pPr>
             <a:r>
               <a:rPr lang="en-US" sz="2000">
-                <a:latin typeface="Calibri"/>
+                <a:latin typeface="Arial"/>
               </a:rPr>
               <a:t>Fourth Outline Level</a:t>
             </a:r>
@@ -2573,7 +2480,7 @@
             </a:pPr>
             <a:r>
               <a:rPr lang="en-US" sz="2000">
-                <a:latin typeface="Calibri"/>
+                <a:latin typeface="Arial"/>
               </a:rPr>
               <a:t>Fifth Outline Level</a:t>
             </a:r>
@@ -2587,7 +2494,7 @@
             </a:pPr>
             <a:r>
               <a:rPr lang="en-US" sz="2000">
-                <a:latin typeface="Calibri"/>
+                <a:latin typeface="Arial"/>
               </a:rPr>
               <a:t>Sixth Outline Level</a:t>
             </a:r>
@@ -2601,7 +2508,7 @@
             </a:pPr>
             <a:r>
               <a:rPr lang="en-US" sz="2000">
-                <a:latin typeface="Calibri"/>
+                <a:latin typeface="Arial"/>
               </a:rPr>
               <a:t>Seventh Outline Level</a:t>
             </a:r>
@@ -2655,7 +2562,7 @@
       </p:grpSpPr>
       <p:sp>
         <p:nvSpPr>
-          <p:cNvPr id="39" name="PlaceHolder 1"/>
+          <p:cNvPr id="36" name="PlaceHolder 1"/>
           <p:cNvSpPr>
             <a:spLocks noGrp="1"/>
           </p:cNvSpPr>
@@ -2665,29 +2572,22 @@
         </p:nvSpPr>
         <p:spPr>
           <a:xfrm>
-            <a:off x="457200" y="274680"/>
-            <a:ext cx="8229240" cy="1142640"/>
-          </a:xfrm>
-          <a:prstGeom prst="rect">
-            <a:avLst/>
-          </a:prstGeom>
-        </p:spPr>
-        <p:txBody>
-          <a:bodyPr anchor="ctr"/>
-          <a:p>
-            <a:pPr algn="ctr">
-              <a:lnSpc>
-                <a:spcPct val="100000"/>
-              </a:lnSpc>
-            </a:pPr>
+            <a:off x="457200" y="273600"/>
+            <a:ext cx="8229240" cy="1144800"/>
+          </a:xfrm>
+          <a:prstGeom prst="rect">
+            <a:avLst/>
+          </a:prstGeom>
+        </p:spPr>
+        <p:txBody>
+          <a:bodyPr lIns="0" rIns="0" tIns="0" bIns="0" anchor="ctr"/>
+          <a:p>
+            <a:pPr algn="ctr"/>
             <a:r>
               <a:rPr lang="en-US" sz="4400">
-                <a:solidFill>
-                  <a:srgbClr val="000000"/>
-                </a:solidFill>
-                <a:latin typeface="Calibri"/>
+                <a:latin typeface="Arial"/>
               </a:rPr>
-              <a:t>Click to edit the title text formatClick to edit Master title style</a:t>
+              <a:t>Click to edit the title text format</a:t>
             </a:r>
             <a:endParaRPr/>
           </a:p>
@@ -2695,7 +2595,7 @@
       </p:sp>
       <p:sp>
         <p:nvSpPr>
-          <p:cNvPr id="40" name="PlaceHolder 2"/>
+          <p:cNvPr id="37" name="PlaceHolder 2"/>
           <p:cNvSpPr>
             <a:spLocks noGrp="1"/>
           </p:cNvSpPr>
@@ -2705,15 +2605,15 @@
         </p:nvSpPr>
         <p:spPr>
           <a:xfrm>
-            <a:off x="457200" y="1600200"/>
-            <a:ext cx="8229240" cy="4525560"/>
-          </a:xfrm>
-          <a:prstGeom prst="rect">
-            <a:avLst/>
-          </a:prstGeom>
-        </p:spPr>
-        <p:txBody>
-          <a:bodyPr/>
+            <a:off x="457200" y="1604520"/>
+            <a:ext cx="8229240" cy="3977280"/>
+          </a:xfrm>
+          <a:prstGeom prst="rect">
+            <a:avLst/>
+          </a:prstGeom>
+        </p:spPr>
+        <p:txBody>
+          <a:bodyPr lIns="0" rIns="0" tIns="0" bIns="0"/>
           <a:p>
             <a:pPr>
               <a:buSzPct val="45000"/>
@@ -2722,10 +2622,7 @@
             </a:pPr>
             <a:r>
               <a:rPr lang="en-US" sz="3200">
-                <a:solidFill>
-                  <a:srgbClr val="000000"/>
-                </a:solidFill>
-                <a:latin typeface="Calibri"/>
+                <a:latin typeface="Arial"/>
               </a:rPr>
               <a:t>Click to edit the outline text format</a:t>
             </a:r>
@@ -2738,11 +2635,8 @@
               <a:buChar char=""/>
             </a:pPr>
             <a:r>
-              <a:rPr lang="en-US" sz="3200">
-                <a:solidFill>
-                  <a:srgbClr val="000000"/>
-                </a:solidFill>
-                <a:latin typeface="Calibri"/>
+              <a:rPr lang="en-US" sz="2800">
+                <a:latin typeface="Arial"/>
               </a:rPr>
               <a:t>Second Outline Level</a:t>
             </a:r>
@@ -2755,11 +2649,8 @@
               <a:buChar char=""/>
             </a:pPr>
             <a:r>
-              <a:rPr lang="en-US" sz="3200">
-                <a:solidFill>
-                  <a:srgbClr val="000000"/>
-                </a:solidFill>
-                <a:latin typeface="Calibri"/>
+              <a:rPr lang="en-US" sz="2400">
+                <a:latin typeface="Arial"/>
               </a:rPr>
               <a:t>Third Outline Level</a:t>
             </a:r>
@@ -2772,11 +2663,8 @@
               <a:buChar char=""/>
             </a:pPr>
             <a:r>
-              <a:rPr lang="en-US" sz="3200">
-                <a:solidFill>
-                  <a:srgbClr val="000000"/>
-                </a:solidFill>
-                <a:latin typeface="Calibri"/>
+              <a:rPr lang="en-US" sz="2000">
+                <a:latin typeface="Arial"/>
               </a:rPr>
               <a:t>Fourth Outline Level</a:t>
             </a:r>
@@ -2789,11 +2677,8 @@
               <a:buChar char=""/>
             </a:pPr>
             <a:r>
-              <a:rPr lang="en-US" sz="3200">
-                <a:solidFill>
-                  <a:srgbClr val="000000"/>
-                </a:solidFill>
-                <a:latin typeface="Calibri"/>
+              <a:rPr lang="en-US" sz="2000">
+                <a:latin typeface="Arial"/>
               </a:rPr>
               <a:t>Fifth Outline Level</a:t>
             </a:r>
@@ -2806,215 +2691,25 @@
               <a:buChar char=""/>
             </a:pPr>
             <a:r>
-              <a:rPr lang="en-US" sz="3200">
-                <a:solidFill>
-                  <a:srgbClr val="000000"/>
-                </a:solidFill>
-                <a:latin typeface="Calibri"/>
+              <a:rPr lang="en-US" sz="2000">
+                <a:latin typeface="Arial"/>
               </a:rPr>
               <a:t>Sixth Outline Level</a:t>
             </a:r>
             <a:endParaRPr/>
           </a:p>
           <a:p>
-            <a:pPr>
-              <a:lnSpc>
-                <a:spcPct val="100000"/>
-              </a:lnSpc>
-              <a:buFont typeface="Arial"/>
-              <a:buChar char="•"/>
-            </a:pPr>
-            <a:r>
-              <a:rPr lang="en-US" sz="3200">
-                <a:solidFill>
-                  <a:srgbClr val="000000"/>
-                </a:solidFill>
-                <a:latin typeface="Calibri"/>
-              </a:rPr>
-              <a:t>Seventh Outline LevelClick to edit Master text styles</a:t>
-            </a:r>
-            <a:endParaRPr/>
-          </a:p>
-          <a:p>
-            <a:pPr lvl="1">
-              <a:lnSpc>
-                <a:spcPct val="100000"/>
-              </a:lnSpc>
-              <a:buFont typeface="Arial"/>
-              <a:buChar char="–"/>
-            </a:pPr>
-            <a:r>
-              <a:rPr lang="en-US" sz="2800">
-                <a:solidFill>
-                  <a:srgbClr val="000000"/>
-                </a:solidFill>
-                <a:latin typeface="Calibri"/>
-              </a:rPr>
-              <a:t>Second level</a:t>
-            </a:r>
-            <a:endParaRPr/>
-          </a:p>
-          <a:p>
-            <a:pPr lvl="2">
-              <a:lnSpc>
-                <a:spcPct val="100000"/>
-              </a:lnSpc>
-              <a:buFont typeface="Arial"/>
-              <a:buChar char="•"/>
-            </a:pPr>
-            <a:r>
-              <a:rPr lang="en-US" sz="2400">
-                <a:solidFill>
-                  <a:srgbClr val="000000"/>
-                </a:solidFill>
-                <a:latin typeface="Calibri"/>
-              </a:rPr>
-              <a:t>Third level</a:t>
-            </a:r>
-            <a:endParaRPr/>
-          </a:p>
-          <a:p>
-            <a:pPr lvl="3">
-              <a:lnSpc>
-                <a:spcPct val="100000"/>
-              </a:lnSpc>
-              <a:buFont typeface="Arial"/>
-              <a:buChar char="–"/>
+            <a:pPr lvl="6">
+              <a:buSzPct val="45000"/>
+              <a:buFont typeface="StarSymbol"/>
+              <a:buChar char=""/>
             </a:pPr>
             <a:r>
               <a:rPr lang="en-US" sz="2000">
-                <a:solidFill>
-                  <a:srgbClr val="000000"/>
-                </a:solidFill>
-                <a:latin typeface="Calibri"/>
+                <a:latin typeface="Arial"/>
               </a:rPr>
-              <a:t>Fourth level</a:t>
+              <a:t>Seventh Outline Level</a:t>
             </a:r>
-            <a:endParaRPr/>
-          </a:p>
-          <a:p>
-            <a:pPr lvl="4">
-              <a:lnSpc>
-                <a:spcPct val="100000"/>
-              </a:lnSpc>
-              <a:buFont typeface="Arial"/>
-              <a:buChar char="»"/>
-            </a:pPr>
-            <a:r>
-              <a:rPr lang="en-US" sz="2000">
-                <a:solidFill>
-                  <a:srgbClr val="000000"/>
-                </a:solidFill>
-                <a:latin typeface="Calibri"/>
-              </a:rPr>
-              <a:t>Fifth level</a:t>
-            </a:r>
-            <a:endParaRPr/>
-          </a:p>
-        </p:txBody>
-      </p:sp>
-      <p:sp>
-        <p:nvSpPr>
-          <p:cNvPr id="41" name="PlaceHolder 3"/>
-          <p:cNvSpPr>
-            <a:spLocks noGrp="1"/>
-          </p:cNvSpPr>
-          <p:nvPr>
-            <p:ph type="dt"/>
-          </p:nvPr>
-        </p:nvSpPr>
-        <p:spPr>
-          <a:xfrm>
-            <a:off x="457200" y="6356520"/>
-            <a:ext cx="2133360" cy="364680"/>
-          </a:xfrm>
-          <a:prstGeom prst="rect">
-            <a:avLst/>
-          </a:prstGeom>
-        </p:spPr>
-        <p:txBody>
-          <a:bodyPr anchor="ctr"/>
-          <a:p>
-            <a:pPr>
-              <a:lnSpc>
-                <a:spcPct val="100000"/>
-              </a:lnSpc>
-            </a:pPr>
-            <a:r>
-              <a:rPr lang="en-US" sz="1200">
-                <a:solidFill>
-                  <a:srgbClr val="8b8b8b"/>
-                </a:solidFill>
-                <a:latin typeface="Calibri"/>
-              </a:rPr>
-              <a:t>6/11/15</a:t>
-            </a:r>
-            <a:endParaRPr/>
-          </a:p>
-        </p:txBody>
-      </p:sp>
-      <p:sp>
-        <p:nvSpPr>
-          <p:cNvPr id="42" name="PlaceHolder 4"/>
-          <p:cNvSpPr>
-            <a:spLocks noGrp="1"/>
-          </p:cNvSpPr>
-          <p:nvPr>
-            <p:ph type="ftr"/>
-          </p:nvPr>
-        </p:nvSpPr>
-        <p:spPr>
-          <a:xfrm>
-            <a:off x="3124080" y="6356520"/>
-            <a:ext cx="2895120" cy="364680"/>
-          </a:xfrm>
-          <a:prstGeom prst="rect">
-            <a:avLst/>
-          </a:prstGeom>
-        </p:spPr>
-        <p:txBody>
-          <a:bodyPr anchor="ctr"/>
-          <a:p>
-            <a:endParaRPr/>
-          </a:p>
-        </p:txBody>
-      </p:sp>
-      <p:sp>
-        <p:nvSpPr>
-          <p:cNvPr id="43" name="PlaceHolder 5"/>
-          <p:cNvSpPr>
-            <a:spLocks noGrp="1"/>
-          </p:cNvSpPr>
-          <p:nvPr>
-            <p:ph type="sldNum"/>
-          </p:nvPr>
-        </p:nvSpPr>
-        <p:spPr>
-          <a:xfrm>
-            <a:off x="6553080" y="6356520"/>
-            <a:ext cx="2133360" cy="364680"/>
-          </a:xfrm>
-          <a:prstGeom prst="rect">
-            <a:avLst/>
-          </a:prstGeom>
-        </p:spPr>
-        <p:txBody>
-          <a:bodyPr anchor="ctr"/>
-          <a:p>
-            <a:pPr algn="r">
-              <a:lnSpc>
-                <a:spcPct val="100000"/>
-              </a:lnSpc>
-            </a:pPr>
-            <a:fld id="{86874260-031E-4294-8B29-8792FB6780C5}" type="slidenum">
-              <a:rPr lang="en-US" sz="1200">
-                <a:solidFill>
-                  <a:srgbClr val="8b8b8b"/>
-                </a:solidFill>
-                <a:latin typeface="Calibri"/>
-              </a:rPr>
-              <a:t>&lt;number&gt;</a:t>
-            </a:fld>
             <a:endParaRPr/>
           </a:p>
         </p:txBody>
@@ -3058,52 +2753,47 @@
       </p:grpSpPr>
       <p:sp>
         <p:nvSpPr>
-          <p:cNvPr id="78" name="TextShape 1"/>
-          <p:cNvSpPr txBox="1"/>
+          <p:cNvPr id="72" name="CustomShape 1"/>
+          <p:cNvSpPr/>
           <p:nvPr/>
         </p:nvSpPr>
         <p:spPr>
           <a:xfrm>
             <a:off x="685800" y="2130480"/>
-            <a:ext cx="7772040" cy="1469520"/>
-          </a:xfrm>
-          <a:prstGeom prst="rect">
-            <a:avLst/>
-          </a:prstGeom>
-        </p:spPr>
-        <p:txBody>
-          <a:bodyPr anchor="ctr"/>
-          <a:p>
-            <a:endParaRPr/>
-          </a:p>
-        </p:txBody>
-      </p:sp>
-      <p:sp>
-        <p:nvSpPr>
-          <p:cNvPr id="79" name="TextShape 2"/>
-          <p:cNvSpPr txBox="1"/>
+            <a:ext cx="7771680" cy="1469160"/>
+          </a:xfrm>
+          <a:prstGeom prst="rect">
+            <a:avLst/>
+          </a:prstGeom>
+          <a:noFill/>
+          <a:ln>
+            <a:noFill/>
+          </a:ln>
+        </p:spPr>
+      </p:sp>
+      <p:sp>
+        <p:nvSpPr>
+          <p:cNvPr id="73" name="CustomShape 2"/>
+          <p:cNvSpPr/>
           <p:nvPr/>
         </p:nvSpPr>
         <p:spPr>
           <a:xfrm>
             <a:off x="1371600" y="3886200"/>
-            <a:ext cx="6400440" cy="1752120"/>
-          </a:xfrm>
-          <a:prstGeom prst="rect">
-            <a:avLst/>
-          </a:prstGeom>
-        </p:spPr>
-        <p:txBody>
-          <a:bodyPr/>
-          <a:p>
-            <a:pPr algn="ctr"/>
-            <a:endParaRPr/>
-          </a:p>
-        </p:txBody>
+            <a:ext cx="6400080" cy="1751760"/>
+          </a:xfrm>
+          <a:prstGeom prst="rect">
+            <a:avLst/>
+          </a:prstGeom>
+          <a:noFill/>
+          <a:ln>
+            <a:noFill/>
+          </a:ln>
+        </p:spPr>
       </p:sp>
       <p:pic>
         <p:nvPicPr>
-          <p:cNvPr id="80" name="Picture 3" descr=""/>
+          <p:cNvPr id="74" name="Picture 3" descr=""/>
           <p:cNvPicPr/>
           <p:nvPr/>
         </p:nvPicPr>
@@ -3116,7 +2806,7 @@
         <p:spPr>
           <a:xfrm>
             <a:off x="-76320" y="0"/>
-            <a:ext cx="9219960" cy="6857640"/>
+            <a:ext cx="9219600" cy="6857280"/>
           </a:xfrm>
           <a:prstGeom prst="rect">
             <a:avLst/>
@@ -3128,14 +2818,14 @@
       </p:pic>
       <p:sp>
         <p:nvSpPr>
-          <p:cNvPr id="81" name="CustomShape 3"/>
+          <p:cNvPr id="75" name="CustomShape 3"/>
           <p:cNvSpPr/>
           <p:nvPr/>
         </p:nvSpPr>
         <p:spPr>
           <a:xfrm>
             <a:off x="609480" y="762120"/>
-            <a:ext cx="7924320" cy="913320"/>
+            <a:ext cx="7923960" cy="912960"/>
           </a:xfrm>
           <a:prstGeom prst="rect">
             <a:avLst/>
@@ -3169,14 +2859,14 @@
       </p:sp>
       <p:sp>
         <p:nvSpPr>
-          <p:cNvPr id="82" name="CustomShape 4"/>
+          <p:cNvPr id="76" name="CustomShape 4"/>
           <p:cNvSpPr/>
           <p:nvPr/>
         </p:nvSpPr>
         <p:spPr>
           <a:xfrm>
             <a:off x="1676520" y="4869360"/>
-            <a:ext cx="6705360" cy="760680"/>
+            <a:ext cx="6705000" cy="760320"/>
           </a:xfrm>
           <a:prstGeom prst="rect">
             <a:avLst/>
@@ -3242,6 +2932,80 @@
 <file path=ppt/slides/slide10.xml><?xml version="1.0" encoding="utf-8"?>
 <p:sld xmlns:a="http://schemas.openxmlformats.org/drawingml/2006/main" xmlns:p="http://schemas.openxmlformats.org/presentationml/2006/main" xmlns:r="http://schemas.openxmlformats.org/officeDocument/2006/relationships">
   <p:cSld>
+    <p:spTree>
+      <p:nvGrpSpPr>
+        <p:cNvPr id="1" name=""/>
+        <p:cNvGrpSpPr/>
+        <p:nvPr/>
+      </p:nvGrpSpPr>
+      <p:grpSpPr>
+        <a:xfrm>
+          <a:off x="0" y="0"/>
+          <a:ext cx="0" cy="0"/>
+          <a:chOff x="0" y="0"/>
+          <a:chExt cx="0" cy="0"/>
+        </a:xfrm>
+      </p:grpSpPr>
+      <p:pic>
+        <p:nvPicPr>
+          <p:cNvPr id="89" name="" descr=""/>
+          <p:cNvPicPr/>
+          <p:nvPr/>
+        </p:nvPicPr>
+        <p:blipFill>
+          <a:blip r:embed="rId1"/>
+          <a:stretch>
+            <a:fillRect/>
+          </a:stretch>
+        </p:blipFill>
+        <p:spPr>
+          <a:xfrm>
+            <a:off x="360" y="12960"/>
+            <a:ext cx="9143640" cy="6479280"/>
+          </a:xfrm>
+          <a:prstGeom prst="rect">
+            <a:avLst/>
+          </a:prstGeom>
+          <a:ln>
+            <a:noFill/>
+          </a:ln>
+        </p:spPr>
+      </p:pic>
+    </p:spTree>
+  </p:cSld>
+  <p:timing>
+    <p:tnLst>
+      <p:par>
+        <p:cTn id="19" dur="indefinite" restart="never" nodeType="tmRoot">
+          <p:childTnLst>
+            <p:seq>
+              <p:cTn id="20" nodeType="mainSeq"/>
+              <p:prevCondLst>
+                <p:cond delay="0" evt="onPrev">
+                  <p:tgtEl>
+                    <p:sldTgt/>
+                  </p:tgtEl>
+                </p:cond>
+              </p:prevCondLst>
+              <p:nextCondLst>
+                <p:cond delay="0" evt="onNext">
+                  <p:tgtEl>
+                    <p:sldTgt/>
+                  </p:tgtEl>
+                </p:cond>
+              </p:nextCondLst>
+            </p:seq>
+          </p:childTnLst>
+        </p:cTn>
+      </p:par>
+    </p:tnLst>
+  </p:timing>
+</p:sld>
+</file>
+
+<file path=ppt/slides/slide11.xml><?xml version="1.0" encoding="utf-8"?>
+<p:sld xmlns:a="http://schemas.openxmlformats.org/drawingml/2006/main" xmlns:p="http://schemas.openxmlformats.org/presentationml/2006/main" xmlns:r="http://schemas.openxmlformats.org/officeDocument/2006/relationships">
+  <p:cSld>
     <p:bg>
       <p:bgPr>
         <a:blipFill>
@@ -3268,21 +3032,25 @@
       </p:grpSpPr>
       <p:sp>
         <p:nvSpPr>
-          <p:cNvPr id="95" name="TextShape 1"/>
-          <p:cNvSpPr txBox="1"/>
+          <p:cNvPr id="90" name="CustomShape 1"/>
+          <p:cNvSpPr/>
           <p:nvPr/>
         </p:nvSpPr>
         <p:spPr>
           <a:xfrm>
             <a:off x="990720" y="274680"/>
-            <a:ext cx="7695720" cy="1142640"/>
-          </a:xfrm>
-          <a:prstGeom prst="rect">
-            <a:avLst/>
-          </a:prstGeom>
-        </p:spPr>
-        <p:txBody>
-          <a:bodyPr anchor="ctr"/>
+            <a:ext cx="7695360" cy="1142280"/>
+          </a:xfrm>
+          <a:prstGeom prst="rect">
+            <a:avLst/>
+          </a:prstGeom>
+          <a:noFill/>
+          <a:ln>
+            <a:noFill/>
+          </a:ln>
+        </p:spPr>
+        <p:txBody>
+          <a:bodyPr lIns="90000" rIns="90000" tIns="45000" bIns="45000" anchor="ctr"/>
           <a:p>
             <a:pPr algn="ctr">
               <a:lnSpc>
@@ -3305,50 +3073,57 @@
       </p:sp>
       <p:sp>
         <p:nvSpPr>
-          <p:cNvPr id="96" name="TextShape 2"/>
-          <p:cNvSpPr txBox="1"/>
+          <p:cNvPr id="91" name="CustomShape 2"/>
+          <p:cNvSpPr/>
           <p:nvPr/>
         </p:nvSpPr>
         <p:spPr>
           <a:xfrm>
             <a:off x="457200" y="1600200"/>
-            <a:ext cx="8229240" cy="4525560"/>
-          </a:xfrm>
-          <a:prstGeom prst="rect">
-            <a:avLst/>
-          </a:prstGeom>
-        </p:spPr>
-        <p:txBody>
-          <a:bodyPr/>
+            <a:ext cx="8228880" cy="4525200"/>
+          </a:xfrm>
+          <a:prstGeom prst="rect">
+            <a:avLst/>
+          </a:prstGeom>
+          <a:noFill/>
+          <a:ln>
+            <a:noFill/>
+          </a:ln>
+        </p:spPr>
+        <p:txBody>
+          <a:bodyPr lIns="90000" rIns="90000" tIns="45000" bIns="45000"/>
           <a:p>
             <a:pPr>
+              <a:lnSpc>
+                <a:spcPct val="100000"/>
+              </a:lnSpc>
+            </a:pPr>
+            <a:endParaRPr/>
+          </a:p>
+          <a:p>
+            <a:pPr>
+              <a:lnSpc>
+                <a:spcPct val="100000"/>
+              </a:lnSpc>
+            </a:pPr>
+            <a:endParaRPr/>
+          </a:p>
+          <a:p>
+            <a:pPr>
+              <a:lnSpc>
+                <a:spcPct val="100000"/>
+              </a:lnSpc>
+            </a:pPr>
+            <a:endParaRPr/>
+          </a:p>
+          <a:p>
+            <a:pPr>
+              <a:lnSpc>
+                <a:spcPct val="100000"/>
+              </a:lnSpc>
               <a:buSzPct val="45000"/>
               <a:buFont typeface="StarSymbol"/>
-              <a:buChar char=""/>
-            </a:pPr>
-            <a:endParaRPr/>
-          </a:p>
-          <a:p>
-            <a:pPr>
-              <a:buSzPct val="45000"/>
-              <a:buFont typeface="StarSymbol"/>
-              <a:buChar char=""/>
-            </a:pPr>
-            <a:endParaRPr/>
-          </a:p>
-          <a:p>
-            <a:pPr>
-              <a:buSzPct val="45000"/>
-              <a:buFont typeface="StarSymbol"/>
-              <a:buChar char=""/>
-            </a:pPr>
-            <a:endParaRPr/>
-          </a:p>
-          <a:p>
-            <a:pPr>
-              <a:buSzPct val="45000"/>
-              <a:buFont typeface="StarSymbol"/>
-              <a:buChar char=""/>
+              <a:buChar char="l"/>
             </a:pPr>
             <a:r>
               <a:rPr lang="en-US" sz="3200">
@@ -3368,10 +3143,10 @@
   <p:timing>
     <p:tnLst>
       <p:par>
-        <p:cTn id="19" dur="indefinite" restart="never" nodeType="tmRoot">
+        <p:cTn id="21" dur="indefinite" restart="never" nodeType="tmRoot">
           <p:childTnLst>
             <p:seq>
-              <p:cTn id="20" nodeType="mainSeq"/>
+              <p:cTn id="22" nodeType="mainSeq"/>
               <p:prevCondLst>
                 <p:cond delay="0" evt="onPrev">
                   <p:tgtEl>
@@ -3424,21 +3199,25 @@
       </p:grpSpPr>
       <p:sp>
         <p:nvSpPr>
-          <p:cNvPr id="83" name="TextShape 1"/>
-          <p:cNvSpPr txBox="1"/>
+          <p:cNvPr id="77" name="CustomShape 1"/>
+          <p:cNvSpPr/>
           <p:nvPr/>
         </p:nvSpPr>
         <p:spPr>
           <a:xfrm>
             <a:off x="990720" y="274680"/>
-            <a:ext cx="7695720" cy="1142640"/>
-          </a:xfrm>
-          <a:prstGeom prst="rect">
-            <a:avLst/>
-          </a:prstGeom>
-        </p:spPr>
-        <p:txBody>
-          <a:bodyPr anchor="ctr"/>
+            <a:ext cx="7695360" cy="1142280"/>
+          </a:xfrm>
+          <a:prstGeom prst="rect">
+            <a:avLst/>
+          </a:prstGeom>
+          <a:noFill/>
+          <a:ln>
+            <a:noFill/>
+          </a:ln>
+        </p:spPr>
+        <p:txBody>
+          <a:bodyPr lIns="90000" rIns="90000" tIns="45000" bIns="45000" anchor="ctr"/>
           <a:p>
             <a:pPr>
               <a:lnSpc>
@@ -3471,21 +3250,25 @@
       </p:sp>
       <p:sp>
         <p:nvSpPr>
-          <p:cNvPr id="84" name="TextShape 2"/>
-          <p:cNvSpPr txBox="1"/>
+          <p:cNvPr id="78" name="CustomShape 2"/>
+          <p:cNvSpPr/>
           <p:nvPr/>
         </p:nvSpPr>
         <p:spPr>
           <a:xfrm>
             <a:off x="457200" y="1600200"/>
-            <a:ext cx="8229240" cy="4525560"/>
-          </a:xfrm>
-          <a:prstGeom prst="rect">
-            <a:avLst/>
-          </a:prstGeom>
-        </p:spPr>
-        <p:txBody>
-          <a:bodyPr/>
+            <a:ext cx="8228880" cy="4525200"/>
+          </a:xfrm>
+          <a:prstGeom prst="rect">
+            <a:avLst/>
+          </a:prstGeom>
+          <a:noFill/>
+          <a:ln>
+            <a:noFill/>
+          </a:ln>
+        </p:spPr>
+        <p:txBody>
+          <a:bodyPr lIns="90000" rIns="90000" tIns="45000" bIns="45000"/>
           <a:p>
             <a:pPr>
               <a:lnSpc>
@@ -3653,21 +3436,25 @@
       </p:grpSpPr>
       <p:sp>
         <p:nvSpPr>
-          <p:cNvPr id="85" name="TextShape 1"/>
-          <p:cNvSpPr txBox="1"/>
+          <p:cNvPr id="79" name="CustomShape 1"/>
+          <p:cNvSpPr/>
           <p:nvPr/>
         </p:nvSpPr>
         <p:spPr>
           <a:xfrm>
             <a:off x="990720" y="274680"/>
-            <a:ext cx="7695720" cy="1142640"/>
-          </a:xfrm>
-          <a:prstGeom prst="rect">
-            <a:avLst/>
-          </a:prstGeom>
-        </p:spPr>
-        <p:txBody>
-          <a:bodyPr anchor="ctr"/>
+            <a:ext cx="7695360" cy="1142280"/>
+          </a:xfrm>
+          <a:prstGeom prst="rect">
+            <a:avLst/>
+          </a:prstGeom>
+          <a:noFill/>
+          <a:ln>
+            <a:noFill/>
+          </a:ln>
+        </p:spPr>
+        <p:txBody>
+          <a:bodyPr lIns="90000" rIns="90000" tIns="45000" bIns="45000" anchor="ctr"/>
           <a:p>
             <a:pPr>
               <a:lnSpc>
@@ -3720,21 +3507,25 @@
       </p:sp>
       <p:sp>
         <p:nvSpPr>
-          <p:cNvPr id="86" name="TextShape 2"/>
-          <p:cNvSpPr txBox="1"/>
+          <p:cNvPr id="80" name="CustomShape 2"/>
+          <p:cNvSpPr/>
           <p:nvPr/>
         </p:nvSpPr>
         <p:spPr>
           <a:xfrm>
             <a:off x="457200" y="1600200"/>
-            <a:ext cx="8229240" cy="4525560"/>
-          </a:xfrm>
-          <a:prstGeom prst="rect">
-            <a:avLst/>
-          </a:prstGeom>
-        </p:spPr>
-        <p:txBody>
-          <a:bodyPr/>
+            <a:ext cx="8228880" cy="4525200"/>
+          </a:xfrm>
+          <a:prstGeom prst="rect">
+            <a:avLst/>
+          </a:prstGeom>
+          <a:noFill/>
+          <a:ln>
+            <a:noFill/>
+          </a:ln>
+        </p:spPr>
+        <p:txBody>
+          <a:bodyPr lIns="90000" rIns="90000" tIns="45000" bIns="45000"/>
           <a:p>
             <a:pPr>
               <a:lnSpc>
@@ -3914,21 +3705,25 @@
       </p:grpSpPr>
       <p:sp>
         <p:nvSpPr>
-          <p:cNvPr id="87" name="TextShape 1"/>
-          <p:cNvSpPr txBox="1"/>
+          <p:cNvPr id="81" name="CustomShape 1"/>
+          <p:cNvSpPr/>
           <p:nvPr/>
         </p:nvSpPr>
         <p:spPr>
           <a:xfrm>
             <a:off x="990720" y="274680"/>
-            <a:ext cx="7695720" cy="1142640"/>
-          </a:xfrm>
-          <a:prstGeom prst="rect">
-            <a:avLst/>
-          </a:prstGeom>
-        </p:spPr>
-        <p:txBody>
-          <a:bodyPr anchor="ctr"/>
+            <a:ext cx="7695360" cy="1142280"/>
+          </a:xfrm>
+          <a:prstGeom prst="rect">
+            <a:avLst/>
+          </a:prstGeom>
+          <a:noFill/>
+          <a:ln>
+            <a:noFill/>
+          </a:ln>
+        </p:spPr>
+        <p:txBody>
+          <a:bodyPr lIns="90000" rIns="90000" tIns="45000" bIns="45000" anchor="ctr"/>
           <a:p>
             <a:pPr>
               <a:lnSpc>
@@ -3951,21 +3746,25 @@
       </p:sp>
       <p:sp>
         <p:nvSpPr>
-          <p:cNvPr id="88" name="TextShape 2"/>
-          <p:cNvSpPr txBox="1"/>
+          <p:cNvPr id="82" name="CustomShape 2"/>
+          <p:cNvSpPr/>
           <p:nvPr/>
         </p:nvSpPr>
         <p:spPr>
           <a:xfrm>
             <a:off x="457200" y="1600200"/>
-            <a:ext cx="8229240" cy="4525560"/>
-          </a:xfrm>
-          <a:prstGeom prst="rect">
-            <a:avLst/>
-          </a:prstGeom>
-        </p:spPr>
-        <p:txBody>
-          <a:bodyPr/>
+            <a:ext cx="8228880" cy="4525200"/>
+          </a:xfrm>
+          <a:prstGeom prst="rect">
+            <a:avLst/>
+          </a:prstGeom>
+          <a:noFill/>
+          <a:ln>
+            <a:noFill/>
+          </a:ln>
+        </p:spPr>
+        <p:txBody>
+          <a:bodyPr lIns="90000" rIns="90000" tIns="45000" bIns="45000"/>
           <a:p>
             <a:pPr>
               <a:lnSpc>
@@ -3991,8 +3790,6 @@
               <a:lnSpc>
                 <a:spcPct val="100000"/>
               </a:lnSpc>
-              <a:buFont typeface="Arial"/>
-              <a:buChar char="•"/>
             </a:pPr>
             <a:endParaRPr/>
           </a:p>
@@ -4046,9 +3843,12 @@
           </a:p>
           <a:p>
             <a:pPr lvl="1">
+              <a:lnSpc>
+                <a:spcPct val="100000"/>
+              </a:lnSpc>
               <a:buSzPct val="75000"/>
               <a:buFont typeface="StarSymbol"/>
-              <a:buChar char=""/>
+              <a:buChar char="l"/>
             </a:pPr>
             <a:r>
               <a:rPr lang="en-US" sz="2000">
@@ -4125,21 +3925,25 @@
       </p:grpSpPr>
       <p:sp>
         <p:nvSpPr>
-          <p:cNvPr id="89" name="TextShape 1"/>
-          <p:cNvSpPr txBox="1"/>
+          <p:cNvPr id="83" name="CustomShape 1"/>
+          <p:cNvSpPr/>
           <p:nvPr/>
         </p:nvSpPr>
         <p:spPr>
           <a:xfrm>
             <a:off x="990720" y="274680"/>
-            <a:ext cx="7695720" cy="1142640"/>
-          </a:xfrm>
-          <a:prstGeom prst="rect">
-            <a:avLst/>
-          </a:prstGeom>
-        </p:spPr>
-        <p:txBody>
-          <a:bodyPr anchor="ctr"/>
+            <a:ext cx="7695360" cy="1142280"/>
+          </a:xfrm>
+          <a:prstGeom prst="rect">
+            <a:avLst/>
+          </a:prstGeom>
+          <a:noFill/>
+          <a:ln>
+            <a:noFill/>
+          </a:ln>
+        </p:spPr>
+        <p:txBody>
+          <a:bodyPr lIns="90000" rIns="90000" tIns="45000" bIns="45000" anchor="ctr"/>
           <a:p>
             <a:pPr>
               <a:lnSpc>
@@ -4162,21 +3966,25 @@
       </p:sp>
       <p:sp>
         <p:nvSpPr>
-          <p:cNvPr id="90" name="TextShape 2"/>
-          <p:cNvSpPr txBox="1"/>
+          <p:cNvPr id="84" name="CustomShape 2"/>
+          <p:cNvSpPr/>
           <p:nvPr/>
         </p:nvSpPr>
         <p:spPr>
           <a:xfrm>
             <a:off x="457200" y="1600200"/>
-            <a:ext cx="8229240" cy="4525560"/>
-          </a:xfrm>
-          <a:prstGeom prst="rect">
-            <a:avLst/>
-          </a:prstGeom>
-        </p:spPr>
-        <p:txBody>
-          <a:bodyPr/>
+            <a:ext cx="8228880" cy="4525200"/>
+          </a:xfrm>
+          <a:prstGeom prst="rect">
+            <a:avLst/>
+          </a:prstGeom>
+          <a:noFill/>
+          <a:ln>
+            <a:noFill/>
+          </a:ln>
+        </p:spPr>
+        <p:txBody>
+          <a:bodyPr lIns="90000" rIns="90000" tIns="45000" bIns="45000"/>
           <a:p>
             <a:pPr>
               <a:lnSpc>
@@ -4258,8 +4066,6 @@
               <a:lnSpc>
                 <a:spcPct val="100000"/>
               </a:lnSpc>
-              <a:buFont typeface="Arial"/>
-              <a:buChar char="•"/>
             </a:pPr>
             <a:endParaRPr/>
           </a:p>
@@ -4280,6 +4086,36 @@
                 <a:ea typeface="FangSong"/>
               </a:rPr>
               <a:t>Use Case Diagram</a:t>
+            </a:r>
+            <a:endParaRPr/>
+          </a:p>
+          <a:p>
+            <a:pPr>
+              <a:lnSpc>
+                <a:spcPct val="100000"/>
+              </a:lnSpc>
+              <a:buFont typeface="Arial"/>
+              <a:buChar char="•"/>
+            </a:pPr>
+            <a:endParaRPr/>
+          </a:p>
+          <a:p>
+            <a:pPr>
+              <a:lnSpc>
+                <a:spcPct val="100000"/>
+              </a:lnSpc>
+              <a:buFont typeface="Arial"/>
+              <a:buChar char="•"/>
+            </a:pPr>
+            <a:r>
+              <a:rPr lang="en-US" sz="2000">
+                <a:solidFill>
+                  <a:srgbClr val="bcdcba"/>
+                </a:solidFill>
+                <a:latin typeface="FangSong"/>
+                <a:ea typeface="FangSong"/>
+              </a:rPr>
+              <a:t>State Machine Diagram</a:t>
             </a:r>
             <a:endParaRPr/>
           </a:p>
@@ -4346,7 +4182,7 @@
       </p:grpSpPr>
       <p:pic>
         <p:nvPicPr>
-          <p:cNvPr id="91" name="" descr=""/>
+          <p:cNvPr id="85" name="" descr=""/>
           <p:cNvPicPr/>
           <p:nvPr/>
         </p:nvPicPr>
@@ -4359,7 +4195,7 @@
         <p:spPr>
           <a:xfrm>
             <a:off x="0" y="-1800"/>
-            <a:ext cx="9144000" cy="6857640"/>
+            <a:ext cx="9143640" cy="6857280"/>
           </a:xfrm>
           <a:prstGeom prst="rect">
             <a:avLst/>
@@ -4430,7 +4266,7 @@
       </p:grpSpPr>
       <p:pic>
         <p:nvPicPr>
-          <p:cNvPr id="92" name="" descr=""/>
+          <p:cNvPr id="86" name="" descr=""/>
           <p:cNvPicPr/>
           <p:nvPr/>
         </p:nvPicPr>
@@ -4443,7 +4279,7 @@
         <p:spPr>
           <a:xfrm>
             <a:off x="3240" y="0"/>
-            <a:ext cx="9143640" cy="6858000"/>
+            <a:ext cx="9143280" cy="6857640"/>
           </a:xfrm>
           <a:prstGeom prst="rect">
             <a:avLst/>
@@ -4514,7 +4350,7 @@
       </p:grpSpPr>
       <p:pic>
         <p:nvPicPr>
-          <p:cNvPr id="93" name="" descr=""/>
+          <p:cNvPr id="87" name="" descr=""/>
           <p:cNvPicPr/>
           <p:nvPr/>
         </p:nvPicPr>
@@ -4527,7 +4363,7 @@
         <p:spPr>
           <a:xfrm>
             <a:off x="3240" y="0"/>
-            <a:ext cx="9143640" cy="6858000"/>
+            <a:ext cx="9143280" cy="6857640"/>
           </a:xfrm>
           <a:prstGeom prst="rect">
             <a:avLst/>
@@ -4598,7 +4434,7 @@
       </p:grpSpPr>
       <p:pic>
         <p:nvPicPr>
-          <p:cNvPr id="94" name="" descr=""/>
+          <p:cNvPr id="88" name="" descr=""/>
           <p:cNvPicPr/>
           <p:nvPr/>
         </p:nvPicPr>
@@ -4611,7 +4447,7 @@
         <p:spPr>
           <a:xfrm>
             <a:off x="0" y="0"/>
-            <a:ext cx="9144000" cy="6858000"/>
+            <a:ext cx="9143640" cy="6857640"/>
           </a:xfrm>
           <a:prstGeom prst="rect">
             <a:avLst/>

</xml_diff>